<commit_message>
Removed EOL mobile services info
</commit_message>
<xml_diff>
--- a/presentations/Session_3_Services_Overview.pptx
+++ b/presentations/Session_3_Services_Overview.pptx
@@ -5,14 +5,14 @@
     <p:sldMasterId id="2147483679" r:id="rId1"/>
   </p:sldMasterIdLst>
   <p:notesMasterIdLst>
-    <p:notesMasterId r:id="rId23"/>
+    <p:notesMasterId r:id="rId17"/>
   </p:notesMasterIdLst>
   <p:sldIdLst>
     <p:sldId id="256" r:id="rId2"/>
     <p:sldId id="476" r:id="rId3"/>
     <p:sldId id="477" r:id="rId4"/>
     <p:sldId id="478" r:id="rId5"/>
-    <p:sldId id="496" r:id="rId6"/>
+    <p:sldId id="497" r:id="rId6"/>
     <p:sldId id="480" r:id="rId7"/>
     <p:sldId id="481" r:id="rId8"/>
     <p:sldId id="482" r:id="rId9"/>
@@ -22,13 +22,7 @@
     <p:sldId id="486" r:id="rId13"/>
     <p:sldId id="487" r:id="rId14"/>
     <p:sldId id="488" r:id="rId15"/>
-    <p:sldId id="489" r:id="rId16"/>
-    <p:sldId id="490" r:id="rId17"/>
-    <p:sldId id="491" r:id="rId18"/>
-    <p:sldId id="492" r:id="rId19"/>
-    <p:sldId id="493" r:id="rId20"/>
-    <p:sldId id="494" r:id="rId21"/>
-    <p:sldId id="495" r:id="rId22"/>
+    <p:sldId id="492" r:id="rId16"/>
   </p:sldIdLst>
   <p:sldSz cx="9144000" cy="5143500" type="screen16x9"/>
   <p:notesSz cx="6858000" cy="9144000"/>
@@ -252,7 +246,7 @@
             <p14:sldId id="476"/>
             <p14:sldId id="477"/>
             <p14:sldId id="478"/>
-            <p14:sldId id="496"/>
+            <p14:sldId id="497"/>
             <p14:sldId id="480"/>
             <p14:sldId id="481"/>
             <p14:sldId id="482"/>
@@ -262,13 +256,7 @@
             <p14:sldId id="486"/>
             <p14:sldId id="487"/>
             <p14:sldId id="488"/>
-            <p14:sldId id="489"/>
-            <p14:sldId id="490"/>
-            <p14:sldId id="491"/>
             <p14:sldId id="492"/>
-            <p14:sldId id="493"/>
-            <p14:sldId id="494"/>
-            <p14:sldId id="495"/>
           </p14:sldIdLst>
         </p14:section>
       </p14:sectionLst>
@@ -686,159 +674,6 @@
         </p:nvSpPr>
         <p:spPr>
           <a:xfrm>
-            <a:off x="1610876" y="686430"/>
-            <a:ext cx="3692769" cy="2082905"/>
-          </a:xfrm>
-        </p:spPr>
-      </p:sp>
-      <p:sp>
-        <p:nvSpPr>
-          <p:cNvPr id="3" name="Notes Placeholder 2"/>
-          <p:cNvSpPr>
-            <a:spLocks noGrp="1"/>
-          </p:cNvSpPr>
-          <p:nvPr>
-            <p:ph type="body" idx="1"/>
-          </p:nvPr>
-        </p:nvSpPr>
-        <p:spPr/>
-        <p:txBody>
-          <a:bodyPr/>
-          <a:lstStyle/>
-          <a:p>
-            <a:endParaRPr lang="en-US" dirty="0"/>
-          </a:p>
-        </p:txBody>
-      </p:sp>
-    </p:spTree>
-    <p:extLst>
-      <p:ext uri="{BB962C8B-B14F-4D97-AF65-F5344CB8AC3E}">
-        <p14:creationId xmlns:p14="http://schemas.microsoft.com/office/powerpoint/2010/main" val="3249664746"/>
-      </p:ext>
-    </p:extLst>
-  </p:cSld>
-  <p:clrMapOvr>
-    <a:masterClrMapping/>
-  </p:clrMapOvr>
-</p:notes>
-</file>
-
-<file path=ppt/notesSlides/notesSlide11.xml><?xml version="1.0" encoding="utf-8"?>
-<p:notes xmlns:a="http://schemas.openxmlformats.org/drawingml/2006/main" xmlns:r="http://schemas.openxmlformats.org/officeDocument/2006/relationships" xmlns:p="http://schemas.openxmlformats.org/presentationml/2006/main">
-  <p:cSld>
-    <p:spTree>
-      <p:nvGrpSpPr>
-        <p:cNvPr id="1" name=""/>
-        <p:cNvGrpSpPr/>
-        <p:nvPr/>
-      </p:nvGrpSpPr>
-      <p:grpSpPr>
-        <a:xfrm>
-          <a:off x="0" y="0"/>
-          <a:ext cx="0" cy="0"/>
-          <a:chOff x="0" y="0"/>
-          <a:chExt cx="0" cy="0"/>
-        </a:xfrm>
-      </p:grpSpPr>
-      <p:sp>
-        <p:nvSpPr>
-          <p:cNvPr id="160" name="Shape 160"/>
-          <p:cNvSpPr>
-            <a:spLocks noGrp="1" noRot="1" noChangeAspect="1"/>
-          </p:cNvSpPr>
-          <p:nvPr>
-            <p:ph type="sldImg"/>
-          </p:nvPr>
-        </p:nvSpPr>
-        <p:spPr>
-          <a:xfrm>
-            <a:off x="381000" y="685800"/>
-            <a:ext cx="6096000" cy="3429000"/>
-          </a:xfrm>
-          <a:prstGeom prst="rect">
-            <a:avLst/>
-          </a:prstGeom>
-        </p:spPr>
-        <p:txBody>
-          <a:bodyPr lIns="90571" tIns="45286" rIns="90571" bIns="45286"/>
-          <a:lstStyle/>
-          <a:p>
-            <a:pPr lvl="0"/>
-            <a:endParaRPr/>
-          </a:p>
-        </p:txBody>
-      </p:sp>
-      <p:sp>
-        <p:nvSpPr>
-          <p:cNvPr id="161" name="Shape 161"/>
-          <p:cNvSpPr>
-            <a:spLocks noGrp="1"/>
-          </p:cNvSpPr>
-          <p:nvPr>
-            <p:ph type="body" sz="quarter" idx="1"/>
-          </p:nvPr>
-        </p:nvSpPr>
-        <p:spPr>
-          <a:prstGeom prst="rect">
-            <a:avLst/>
-          </a:prstGeom>
-        </p:spPr>
-        <p:txBody>
-          <a:bodyPr/>
-          <a:lstStyle/>
-          <a:p>
-            <a:pPr lvl="0">
-              <a:defRPr sz="1800"/>
-            </a:pPr>
-            <a:r>
-              <a:rPr sz="2200"/>
-              <a:t>When we established the predominant enterprise architecture paradigms, the vast majority of our clients were usually tethered to a desk with a workstation. Now that has flipped…</a:t>
-            </a:r>
-          </a:p>
-        </p:txBody>
-      </p:sp>
-    </p:spTree>
-    <p:extLst>
-      <p:ext uri="{BB962C8B-B14F-4D97-AF65-F5344CB8AC3E}">
-        <p14:creationId xmlns:p14="http://schemas.microsoft.com/office/powerpoint/2010/main" val="2846791656"/>
-      </p:ext>
-    </p:extLst>
-  </p:cSld>
-  <p:clrMapOvr>
-    <a:masterClrMapping/>
-  </p:clrMapOvr>
-</p:notes>
-</file>
-
-<file path=ppt/notesSlides/notesSlide12.xml><?xml version="1.0" encoding="utf-8"?>
-<p:notes xmlns:a="http://schemas.openxmlformats.org/drawingml/2006/main" xmlns:r="http://schemas.openxmlformats.org/officeDocument/2006/relationships" xmlns:p="http://schemas.openxmlformats.org/presentationml/2006/main">
-  <p:cSld>
-    <p:spTree>
-      <p:nvGrpSpPr>
-        <p:cNvPr id="1" name=""/>
-        <p:cNvGrpSpPr/>
-        <p:nvPr/>
-      </p:nvGrpSpPr>
-      <p:grpSpPr>
-        <a:xfrm>
-          <a:off x="0" y="0"/>
-          <a:ext cx="0" cy="0"/>
-          <a:chOff x="0" y="0"/>
-          <a:chExt cx="0" cy="0"/>
-        </a:xfrm>
-      </p:grpSpPr>
-      <p:sp>
-        <p:nvSpPr>
-          <p:cNvPr id="2" name="Slide Image Placeholder 1"/>
-          <p:cNvSpPr>
-            <a:spLocks noGrp="1" noRot="1" noChangeAspect="1"/>
-          </p:cNvSpPr>
-          <p:nvPr>
-            <p:ph type="sldImg"/>
-          </p:nvPr>
-        </p:nvSpPr>
-        <p:spPr>
-          <a:xfrm>
             <a:off x="381000" y="685800"/>
             <a:ext cx="6096000" cy="3429000"/>
           </a:xfrm>
@@ -859,72 +694,6 @@
           <a:bodyPr/>
           <a:lstStyle/>
           <a:p>
-            <a:endParaRPr lang="en-US" dirty="0"/>
-          </a:p>
-        </p:txBody>
-      </p:sp>
-    </p:spTree>
-    <p:extLst>
-      <p:ext uri="{BB962C8B-B14F-4D97-AF65-F5344CB8AC3E}">
-        <p14:creationId xmlns:p14="http://schemas.microsoft.com/office/powerpoint/2010/main" val="2576152889"/>
-      </p:ext>
-    </p:extLst>
-  </p:cSld>
-  <p:clrMapOvr>
-    <a:masterClrMapping/>
-  </p:clrMapOvr>
-</p:notes>
-</file>
-
-<file path=ppt/notesSlides/notesSlide13.xml><?xml version="1.0" encoding="utf-8"?>
-<p:notes xmlns:a="http://schemas.openxmlformats.org/drawingml/2006/main" xmlns:r="http://schemas.openxmlformats.org/officeDocument/2006/relationships" xmlns:p="http://schemas.openxmlformats.org/presentationml/2006/main">
-  <p:cSld>
-    <p:spTree>
-      <p:nvGrpSpPr>
-        <p:cNvPr id="1" name=""/>
-        <p:cNvGrpSpPr/>
-        <p:nvPr/>
-      </p:nvGrpSpPr>
-      <p:grpSpPr>
-        <a:xfrm>
-          <a:off x="0" y="0"/>
-          <a:ext cx="0" cy="0"/>
-          <a:chOff x="0" y="0"/>
-          <a:chExt cx="0" cy="0"/>
-        </a:xfrm>
-      </p:grpSpPr>
-      <p:sp>
-        <p:nvSpPr>
-          <p:cNvPr id="2" name="Slide Image Placeholder 1"/>
-          <p:cNvSpPr>
-            <a:spLocks noGrp="1" noRot="1" noChangeAspect="1"/>
-          </p:cNvSpPr>
-          <p:nvPr>
-            <p:ph type="sldImg"/>
-          </p:nvPr>
-        </p:nvSpPr>
-        <p:spPr>
-          <a:xfrm>
-            <a:off x="381000" y="685800"/>
-            <a:ext cx="6096000" cy="3429000"/>
-          </a:xfrm>
-        </p:spPr>
-      </p:sp>
-      <p:sp>
-        <p:nvSpPr>
-          <p:cNvPr id="3" name="Notes Placeholder 2"/>
-          <p:cNvSpPr>
-            <a:spLocks noGrp="1"/>
-          </p:cNvSpPr>
-          <p:nvPr>
-            <p:ph type="body" idx="1"/>
-          </p:nvPr>
-        </p:nvSpPr>
-        <p:spPr/>
-        <p:txBody>
-          <a:bodyPr/>
-          <a:lstStyle/>
-          <a:p>
             <a:endParaRPr lang="en-US"/>
           </a:p>
         </p:txBody>
@@ -933,204 +702,6 @@
     <p:extLst>
       <p:ext uri="{BB962C8B-B14F-4D97-AF65-F5344CB8AC3E}">
         <p14:creationId xmlns:p14="http://schemas.microsoft.com/office/powerpoint/2010/main" val="1396480869"/>
-      </p:ext>
-    </p:extLst>
-  </p:cSld>
-  <p:clrMapOvr>
-    <a:masterClrMapping/>
-  </p:clrMapOvr>
-</p:notes>
-</file>
-
-<file path=ppt/notesSlides/notesSlide14.xml><?xml version="1.0" encoding="utf-8"?>
-<p:notes xmlns:a="http://schemas.openxmlformats.org/drawingml/2006/main" xmlns:r="http://schemas.openxmlformats.org/officeDocument/2006/relationships" xmlns:p="http://schemas.openxmlformats.org/presentationml/2006/main">
-  <p:cSld>
-    <p:spTree>
-      <p:nvGrpSpPr>
-        <p:cNvPr id="1" name=""/>
-        <p:cNvGrpSpPr/>
-        <p:nvPr/>
-      </p:nvGrpSpPr>
-      <p:grpSpPr>
-        <a:xfrm>
-          <a:off x="0" y="0"/>
-          <a:ext cx="0" cy="0"/>
-          <a:chOff x="0" y="0"/>
-          <a:chExt cx="0" cy="0"/>
-        </a:xfrm>
-      </p:grpSpPr>
-      <p:sp>
-        <p:nvSpPr>
-          <p:cNvPr id="2" name="Slide Image Placeholder 1"/>
-          <p:cNvSpPr>
-            <a:spLocks noGrp="1" noRot="1" noChangeAspect="1"/>
-          </p:cNvSpPr>
-          <p:nvPr>
-            <p:ph type="sldImg"/>
-          </p:nvPr>
-        </p:nvSpPr>
-        <p:spPr>
-          <a:xfrm>
-            <a:off x="381000" y="685800"/>
-            <a:ext cx="6096000" cy="3429000"/>
-          </a:xfrm>
-        </p:spPr>
-      </p:sp>
-      <p:sp>
-        <p:nvSpPr>
-          <p:cNvPr id="3" name="Notes Placeholder 2"/>
-          <p:cNvSpPr>
-            <a:spLocks noGrp="1"/>
-          </p:cNvSpPr>
-          <p:nvPr>
-            <p:ph type="body" idx="1"/>
-          </p:nvPr>
-        </p:nvSpPr>
-        <p:spPr/>
-        <p:txBody>
-          <a:bodyPr/>
-          <a:lstStyle/>
-          <a:p>
-            <a:endParaRPr lang="en-US"/>
-          </a:p>
-        </p:txBody>
-      </p:sp>
-    </p:spTree>
-    <p:extLst>
-      <p:ext uri="{BB962C8B-B14F-4D97-AF65-F5344CB8AC3E}">
-        <p14:creationId xmlns:p14="http://schemas.microsoft.com/office/powerpoint/2010/main" val="2046182566"/>
-      </p:ext>
-    </p:extLst>
-  </p:cSld>
-  <p:clrMapOvr>
-    <a:masterClrMapping/>
-  </p:clrMapOvr>
-</p:notes>
-</file>
-
-<file path=ppt/notesSlides/notesSlide15.xml><?xml version="1.0" encoding="utf-8"?>
-<p:notes xmlns:a="http://schemas.openxmlformats.org/drawingml/2006/main" xmlns:r="http://schemas.openxmlformats.org/officeDocument/2006/relationships" xmlns:p="http://schemas.openxmlformats.org/presentationml/2006/main">
-  <p:cSld>
-    <p:spTree>
-      <p:nvGrpSpPr>
-        <p:cNvPr id="1" name=""/>
-        <p:cNvGrpSpPr/>
-        <p:nvPr/>
-      </p:nvGrpSpPr>
-      <p:grpSpPr>
-        <a:xfrm>
-          <a:off x="0" y="0"/>
-          <a:ext cx="0" cy="0"/>
-          <a:chOff x="0" y="0"/>
-          <a:chExt cx="0" cy="0"/>
-        </a:xfrm>
-      </p:grpSpPr>
-      <p:sp>
-        <p:nvSpPr>
-          <p:cNvPr id="2" name="Slide Image Placeholder 1"/>
-          <p:cNvSpPr>
-            <a:spLocks noGrp="1" noRot="1" noChangeAspect="1"/>
-          </p:cNvSpPr>
-          <p:nvPr>
-            <p:ph type="sldImg"/>
-          </p:nvPr>
-        </p:nvSpPr>
-        <p:spPr>
-          <a:xfrm>
-            <a:off x="381000" y="685800"/>
-            <a:ext cx="6096000" cy="3429000"/>
-          </a:xfrm>
-        </p:spPr>
-      </p:sp>
-      <p:sp>
-        <p:nvSpPr>
-          <p:cNvPr id="3" name="Notes Placeholder 2"/>
-          <p:cNvSpPr>
-            <a:spLocks noGrp="1"/>
-          </p:cNvSpPr>
-          <p:nvPr>
-            <p:ph type="body" idx="1"/>
-          </p:nvPr>
-        </p:nvSpPr>
-        <p:spPr/>
-        <p:txBody>
-          <a:bodyPr/>
-          <a:lstStyle/>
-          <a:p>
-            <a:endParaRPr lang="en-US"/>
-          </a:p>
-        </p:txBody>
-      </p:sp>
-    </p:spTree>
-    <p:extLst>
-      <p:ext uri="{BB962C8B-B14F-4D97-AF65-F5344CB8AC3E}">
-        <p14:creationId xmlns:p14="http://schemas.microsoft.com/office/powerpoint/2010/main" val="2041210676"/>
-      </p:ext>
-    </p:extLst>
-  </p:cSld>
-  <p:clrMapOvr>
-    <a:masterClrMapping/>
-  </p:clrMapOvr>
-</p:notes>
-</file>
-
-<file path=ppt/notesSlides/notesSlide16.xml><?xml version="1.0" encoding="utf-8"?>
-<p:notes xmlns:a="http://schemas.openxmlformats.org/drawingml/2006/main" xmlns:r="http://schemas.openxmlformats.org/officeDocument/2006/relationships" xmlns:p="http://schemas.openxmlformats.org/presentationml/2006/main">
-  <p:cSld>
-    <p:spTree>
-      <p:nvGrpSpPr>
-        <p:cNvPr id="1" name=""/>
-        <p:cNvGrpSpPr/>
-        <p:nvPr/>
-      </p:nvGrpSpPr>
-      <p:grpSpPr>
-        <a:xfrm>
-          <a:off x="0" y="0"/>
-          <a:ext cx="0" cy="0"/>
-          <a:chOff x="0" y="0"/>
-          <a:chExt cx="0" cy="0"/>
-        </a:xfrm>
-      </p:grpSpPr>
-      <p:sp>
-        <p:nvSpPr>
-          <p:cNvPr id="2" name="Slide Image Placeholder 1"/>
-          <p:cNvSpPr>
-            <a:spLocks noGrp="1" noRot="1" noChangeAspect="1"/>
-          </p:cNvSpPr>
-          <p:nvPr>
-            <p:ph type="sldImg"/>
-          </p:nvPr>
-        </p:nvSpPr>
-        <p:spPr>
-          <a:xfrm>
-            <a:off x="381000" y="685800"/>
-            <a:ext cx="6096000" cy="3429000"/>
-          </a:xfrm>
-        </p:spPr>
-      </p:sp>
-      <p:sp>
-        <p:nvSpPr>
-          <p:cNvPr id="3" name="Notes Placeholder 2"/>
-          <p:cNvSpPr>
-            <a:spLocks noGrp="1"/>
-          </p:cNvSpPr>
-          <p:nvPr>
-            <p:ph type="body" idx="1"/>
-          </p:nvPr>
-        </p:nvSpPr>
-        <p:spPr/>
-        <p:txBody>
-          <a:bodyPr/>
-          <a:lstStyle/>
-          <a:p>
-            <a:endParaRPr lang="en-US"/>
-          </a:p>
-        </p:txBody>
-      </p:sp>
-    </p:spTree>
-    <p:extLst>
-      <p:ext uri="{BB962C8B-B14F-4D97-AF65-F5344CB8AC3E}">
-        <p14:creationId xmlns:p14="http://schemas.microsoft.com/office/powerpoint/2010/main" val="2041210676"/>
       </p:ext>
     </p:extLst>
   </p:cSld>
@@ -1627,11 +1198,7 @@
             </a:pPr>
             <a:r>
               <a:rPr lang="en-US" dirty="0"/>
-              <a:t>Deployed with a multi-node cluster; </a:t>
-            </a:r>
-            <a:r>
-              <a:rPr lang="en-US" dirty="0"/>
-              <a:t>Balanced across Availability zones</a:t>
+              <a:t>Deployed with a multi-node cluster; Balanced across Availability zones</a:t>
             </a:r>
             <a:endParaRPr lang="en-US" dirty="0">
               <a:solidFill>
@@ -6752,7 +6319,6 @@
               <a:rPr lang="en-US" sz="2800" dirty="0" smtClean="0"/>
               <a:t>Services</a:t>
             </a:r>
-            <a:endParaRPr lang="en-US" sz="2800" dirty="0" smtClean="0"/>
           </a:p>
         </p:txBody>
       </p:sp>
@@ -6831,11 +6397,6 @@
               </a:rPr>
               <a:t>Vision: Make all data products cloud-ready.</a:t>
             </a:r>
-            <a:endParaRPr lang="en-US" sz="2800" dirty="0">
-              <a:solidFill>
-                <a:srgbClr val="2C95DD"/>
-              </a:solidFill>
-            </a:endParaRPr>
           </a:p>
         </p:txBody>
       </p:sp>
@@ -7079,11 +6640,6 @@
               </a:rPr>
               <a:t>/Geode</a:t>
             </a:r>
-            <a:endParaRPr lang="en-US" dirty="0" smtClean="0">
-              <a:solidFill>
-                <a:schemeClr val="bg2"/>
-              </a:solidFill>
-            </a:endParaRPr>
           </a:p>
           <a:p>
             <a:pPr marL="285750" indent="-285750">
@@ -7112,21 +6668,8 @@
                   <a:schemeClr val="bg2"/>
                 </a:solidFill>
               </a:rPr>
-              <a:t> (includes HAWQ), Spring </a:t>
-            </a:r>
-            <a:r>
-              <a:rPr lang="en-US" dirty="0" smtClean="0">
-                <a:solidFill>
-                  <a:schemeClr val="bg2"/>
-                </a:solidFill>
-              </a:rPr>
-              <a:t>XD</a:t>
-            </a:r>
-            <a:endParaRPr lang="en-US" dirty="0" smtClean="0">
-              <a:solidFill>
-                <a:schemeClr val="bg2"/>
-              </a:solidFill>
-            </a:endParaRPr>
+              <a:t> (includes HAWQ), Spring XD</a:t>
+            </a:r>
           </a:p>
         </p:txBody>
       </p:sp>
@@ -7590,21 +7133,8 @@
                   <a:srgbClr val="2C95DD"/>
                 </a:solidFill>
               </a:rPr>
-              <a:t>for Pivotal </a:t>
-            </a:r>
-            <a:r>
-              <a:rPr lang="en-US" sz="2800" dirty="0">
-                <a:solidFill>
-                  <a:srgbClr val="2C95DD"/>
-                </a:solidFill>
-              </a:rPr>
-              <a:t>Cloud Foundry</a:t>
-            </a:r>
-            <a:endParaRPr lang="en-US" sz="2800" dirty="0">
-              <a:solidFill>
-                <a:srgbClr val="2C95DD"/>
-              </a:solidFill>
-            </a:endParaRPr>
+              <a:t>for Pivotal Cloud Foundry</a:t>
+            </a:r>
           </a:p>
         </p:txBody>
       </p:sp>
@@ -7969,29 +7499,8 @@
                   <a:srgbClr val="2C95DD"/>
                 </a:solidFill>
               </a:rPr>
-              <a:t>for </a:t>
-            </a:r>
-            <a:r>
-              <a:rPr lang="en-US" sz="2800" dirty="0">
-                <a:solidFill>
-                  <a:srgbClr val="2C95DD"/>
-                </a:solidFill>
-              </a:rPr>
-              <a:t>Pivotal </a:t>
-            </a:r>
-            <a:r>
-              <a:rPr lang="en-US" sz="2800" dirty="0">
-                <a:solidFill>
-                  <a:srgbClr val="2C95DD"/>
-                </a:solidFill>
-              </a:rPr>
-              <a:t>Cloud Foundry </a:t>
-            </a:r>
-            <a:endParaRPr lang="en-US" sz="2800" dirty="0">
-              <a:solidFill>
-                <a:srgbClr val="2C95DD"/>
-              </a:solidFill>
-            </a:endParaRPr>
+              <a:t>for Pivotal Cloud Foundry </a:t>
+            </a:r>
           </a:p>
         </p:txBody>
       </p:sp>
@@ -8036,23 +7545,7 @@
                   <a:srgbClr val="FFFFFF"/>
                 </a:solidFill>
               </a:rPr>
-              <a:t>-provision a </a:t>
-            </a:r>
-            <a:r>
-              <a:rPr lang="en-US" sz="2000" dirty="0">
-                <a:solidFill>
-                  <a:srgbClr val="FFFFFF"/>
-                </a:solidFill>
-              </a:rPr>
-              <a:t>pool</a:t>
-            </a:r>
-            <a:r>
-              <a:rPr lang="en-US" sz="2000" dirty="0">
-                <a:solidFill>
-                  <a:srgbClr val="FFFFFF"/>
-                </a:solidFill>
-              </a:rPr>
-              <a:t> of </a:t>
+              <a:t>-provision a pool of </a:t>
             </a:r>
             <a:r>
               <a:rPr lang="en-US" sz="2000" dirty="0" err="1">
@@ -9192,29 +8685,8 @@
                   <a:srgbClr val="2C95DD"/>
                 </a:solidFill>
               </a:rPr>
-              <a:t>for </a:t>
-            </a:r>
-            <a:r>
-              <a:rPr lang="en-US" sz="2800" dirty="0">
-                <a:solidFill>
-                  <a:srgbClr val="2C95DD"/>
-                </a:solidFill>
-              </a:rPr>
-              <a:t>Pivotal </a:t>
-            </a:r>
-            <a:r>
-              <a:rPr lang="en-US" sz="2800" dirty="0">
-                <a:solidFill>
-                  <a:srgbClr val="2C95DD"/>
-                </a:solidFill>
-              </a:rPr>
-              <a:t>Cloud Foundry</a:t>
-            </a:r>
-            <a:endParaRPr lang="en-US" sz="2800" dirty="0">
-              <a:solidFill>
-                <a:srgbClr val="2C95DD"/>
-              </a:solidFill>
-            </a:endParaRPr>
+              <a:t>for Pivotal Cloud Foundry</a:t>
+            </a:r>
           </a:p>
         </p:txBody>
       </p:sp>
@@ -9868,11 +9340,11 @@
   <p:clrMapOvr>
     <a:masterClrMapping/>
   </p:clrMapOvr>
-  <mc:AlternateContent xmlns:mc="http://schemas.openxmlformats.org/markup-compatibility/2006">
-    <mc:Choice xmlns:p14="http://schemas.microsoft.com/office/powerpoint/2010/main" Requires="p14">
+  <mc:AlternateContent xmlns:mc="http://schemas.openxmlformats.org/markup-compatibility/2006" xmlns:p14="http://schemas.microsoft.com/office/powerpoint/2010/main">
+    <mc:Choice Requires="p14">
       <p:transition spd="slow" p14:dur="2000"/>
     </mc:Choice>
-    <mc:Fallback>
+    <mc:Fallback xmlns="">
       <p:transition xmlns:p14="http://schemas.microsoft.com/office/powerpoint/2010/main" spd="slow"/>
     </mc:Fallback>
   </mc:AlternateContent>
@@ -9880,1474 +9352,6 @@
 </file>
 
 <file path=ppt/slides/slide15.xml><?xml version="1.0" encoding="utf-8"?>
-<p:sld xmlns:a="http://schemas.openxmlformats.org/drawingml/2006/main" xmlns:r="http://schemas.openxmlformats.org/officeDocument/2006/relationships" xmlns:p="http://schemas.openxmlformats.org/presentationml/2006/main">
-  <p:cSld>
-    <p:spTree>
-      <p:nvGrpSpPr>
-        <p:cNvPr id="1" name=""/>
-        <p:cNvGrpSpPr/>
-        <p:nvPr/>
-      </p:nvGrpSpPr>
-      <p:grpSpPr>
-        <a:xfrm>
-          <a:off x="0" y="0"/>
-          <a:ext cx="0" cy="0"/>
-          <a:chOff x="0" y="0"/>
-          <a:chExt cx="0" cy="0"/>
-        </a:xfrm>
-      </p:grpSpPr>
-      <p:pic>
-        <p:nvPicPr>
-          <p:cNvPr id="8" name="Picture 7" descr="DeconstructingMobileMyths.png"/>
-          <p:cNvPicPr>
-            <a:picLocks noChangeAspect="1"/>
-          </p:cNvPicPr>
-          <p:nvPr/>
-        </p:nvPicPr>
-        <p:blipFill rotWithShape="1">
-          <a:blip r:embed="rId3" cstate="screen">
-            <a:grayscl/>
-            <a:extLst>
-              <a:ext uri="{28A0092B-C50C-407E-A947-70E740481C1C}">
-                <a14:useLocalDpi xmlns:a14="http://schemas.microsoft.com/office/drawing/2010/main"/>
-              </a:ext>
-            </a:extLst>
-          </a:blip>
-          <a:srcRect/>
-          <a:stretch/>
-        </p:blipFill>
-        <p:spPr>
-          <a:xfrm>
-            <a:off x="0" y="0"/>
-            <a:ext cx="9144000" cy="5143500"/>
-          </a:xfrm>
-          <a:prstGeom prst="rect">
-            <a:avLst/>
-          </a:prstGeom>
-        </p:spPr>
-      </p:pic>
-      <p:sp>
-        <p:nvSpPr>
-          <p:cNvPr id="4" name="TextBox 3"/>
-          <p:cNvSpPr txBox="1"/>
-          <p:nvPr/>
-        </p:nvSpPr>
-        <p:spPr>
-          <a:xfrm>
-            <a:off x="0" y="3529829"/>
-            <a:ext cx="5615465" cy="1015663"/>
-          </a:xfrm>
-          <a:prstGeom prst="rect">
-            <a:avLst/>
-          </a:prstGeom>
-          <a:solidFill>
-            <a:schemeClr val="tx1">
-              <a:alpha val="74000"/>
-            </a:schemeClr>
-          </a:solidFill>
-        </p:spPr>
-        <p:txBody>
-          <a:bodyPr wrap="none" rtlCol="0">
-            <a:spAutoFit/>
-          </a:bodyPr>
-          <a:lstStyle/>
-          <a:p>
-            <a:r>
-              <a:rPr lang="en-US" sz="6000" dirty="0" smtClean="0">
-                <a:solidFill>
-                  <a:schemeClr val="bg1"/>
-                </a:solidFill>
-              </a:rPr>
-              <a:t>Mobile Services</a:t>
-            </a:r>
-            <a:endParaRPr lang="en-US" sz="6000" dirty="0">
-              <a:solidFill>
-                <a:schemeClr val="bg1"/>
-              </a:solidFill>
-            </a:endParaRPr>
-          </a:p>
-        </p:txBody>
-      </p:sp>
-    </p:spTree>
-    <p:extLst>
-      <p:ext uri="{BB962C8B-B14F-4D97-AF65-F5344CB8AC3E}">
-        <p14:creationId xmlns:p14="http://schemas.microsoft.com/office/powerpoint/2010/main" val="1842463734"/>
-      </p:ext>
-    </p:extLst>
-  </p:cSld>
-  <p:clrMapOvr>
-    <a:masterClrMapping/>
-  </p:clrMapOvr>
-  <mc:AlternateContent xmlns:mc="http://schemas.openxmlformats.org/markup-compatibility/2006">
-    <mc:Choice xmlns:p14="http://schemas.microsoft.com/office/powerpoint/2010/main" Requires="p14">
-      <p:transition spd="slow" p14:dur="2000"/>
-    </mc:Choice>
-    <mc:Fallback>
-      <p:transition xmlns:p14="http://schemas.microsoft.com/office/powerpoint/2010/main" spd="slow"/>
-    </mc:Fallback>
-  </mc:AlternateContent>
-  <p:timing>
-    <p:tnLst>
-      <p:par>
-        <p:cTn xmlns:p14="http://schemas.microsoft.com/office/powerpoint/2010/main" id="1" dur="indefinite" restart="never" nodeType="tmRoot"/>
-      </p:par>
-    </p:tnLst>
-  </p:timing>
-</p:sld>
-</file>
-
-<file path=ppt/slides/slide16.xml><?xml version="1.0" encoding="utf-8"?>
-<p:sld xmlns:a="http://schemas.openxmlformats.org/drawingml/2006/main" xmlns:r="http://schemas.openxmlformats.org/officeDocument/2006/relationships" xmlns:p="http://schemas.openxmlformats.org/presentationml/2006/main">
-  <p:cSld>
-    <p:spTree>
-      <p:nvGrpSpPr>
-        <p:cNvPr id="1" name=""/>
-        <p:cNvGrpSpPr/>
-        <p:nvPr/>
-      </p:nvGrpSpPr>
-      <p:grpSpPr>
-        <a:xfrm>
-          <a:off x="0" y="0"/>
-          <a:ext cx="0" cy="0"/>
-          <a:chOff x="0" y="0"/>
-          <a:chExt cx="0" cy="0"/>
-        </a:xfrm>
-      </p:grpSpPr>
-      <p:pic>
-        <p:nvPicPr>
-          <p:cNvPr id="152" name="pasted-image.pdf"/>
-          <p:cNvPicPr/>
-          <p:nvPr/>
-        </p:nvPicPr>
-        <p:blipFill>
-          <a:blip r:embed="rId3">
-            <a:lum bright="70000" contrast="-70000"/>
-            <a:extLst/>
-          </a:blip>
-          <a:stretch>
-            <a:fillRect/>
-          </a:stretch>
-        </p:blipFill>
-        <p:spPr>
-          <a:xfrm>
-            <a:off x="6849439" y="2271745"/>
-            <a:ext cx="850901" cy="1016001"/>
-          </a:xfrm>
-          <a:prstGeom prst="rect">
-            <a:avLst/>
-          </a:prstGeom>
-          <a:ln w="12700">
-            <a:miter lim="400000"/>
-          </a:ln>
-        </p:spPr>
-      </p:pic>
-      <p:pic>
-        <p:nvPicPr>
-          <p:cNvPr id="153" name="pasted-image.pdf"/>
-          <p:cNvPicPr/>
-          <p:nvPr/>
-        </p:nvPicPr>
-        <p:blipFill>
-          <a:blip r:embed="rId4">
-            <a:lum bright="70000" contrast="-70000"/>
-            <a:extLst/>
-          </a:blip>
-          <a:stretch>
-            <a:fillRect/>
-          </a:stretch>
-        </p:blipFill>
-        <p:spPr>
-          <a:xfrm>
-            <a:off x="5244453" y="2408484"/>
-            <a:ext cx="546101" cy="914401"/>
-          </a:xfrm>
-          <a:prstGeom prst="rect">
-            <a:avLst/>
-          </a:prstGeom>
-          <a:ln w="12700">
-            <a:miter lim="400000"/>
-          </a:ln>
-        </p:spPr>
-      </p:pic>
-      <p:pic>
-        <p:nvPicPr>
-          <p:cNvPr id="154" name="pasted-image.pdf"/>
-          <p:cNvPicPr/>
-          <p:nvPr/>
-        </p:nvPicPr>
-        <p:blipFill>
-          <a:blip r:embed="rId5">
-            <a:lum bright="70000" contrast="-70000"/>
-            <a:extLst/>
-          </a:blip>
-          <a:stretch>
-            <a:fillRect/>
-          </a:stretch>
-        </p:blipFill>
-        <p:spPr>
-          <a:xfrm>
-            <a:off x="3356439" y="2351334"/>
-            <a:ext cx="825501" cy="1003301"/>
-          </a:xfrm>
-          <a:prstGeom prst="rect">
-            <a:avLst/>
-          </a:prstGeom>
-          <a:ln w="12700">
-            <a:miter lim="400000"/>
-          </a:ln>
-        </p:spPr>
-      </p:pic>
-      <p:pic>
-        <p:nvPicPr>
-          <p:cNvPr id="155" name="pasted-image.pdf"/>
-          <p:cNvPicPr/>
-          <p:nvPr/>
-        </p:nvPicPr>
-        <p:blipFill>
-          <a:blip r:embed="rId6">
-            <a:lum bright="70000" contrast="-70000"/>
-            <a:extLst/>
-          </a:blip>
-          <a:stretch>
-            <a:fillRect/>
-          </a:stretch>
-        </p:blipFill>
-        <p:spPr>
-          <a:xfrm>
-            <a:off x="1443025" y="2374900"/>
-            <a:ext cx="850901" cy="1028700"/>
-          </a:xfrm>
-          <a:prstGeom prst="rect">
-            <a:avLst/>
-          </a:prstGeom>
-          <a:ln w="12700">
-            <a:miter lim="400000"/>
-          </a:ln>
-        </p:spPr>
-      </p:pic>
-      <p:sp>
-        <p:nvSpPr>
-          <p:cNvPr id="156" name="Shape 156"/>
-          <p:cNvSpPr>
-            <a:spLocks noGrp="1"/>
-          </p:cNvSpPr>
-          <p:nvPr>
-            <p:ph type="title"/>
-          </p:nvPr>
-        </p:nvSpPr>
-        <p:spPr>
-          <a:prstGeom prst="rect">
-            <a:avLst/>
-          </a:prstGeom>
-        </p:spPr>
-        <p:txBody>
-          <a:bodyPr/>
-          <a:lstStyle/>
-          <a:p>
-            <a:pPr lvl="0">
-              <a:defRPr sz="1800">
-                <a:solidFill>
-                  <a:srgbClr val="000000"/>
-                </a:solidFill>
-                <a:uFillTx/>
-              </a:defRPr>
-            </a:pPr>
-            <a:r>
-              <a:rPr sz="3200" dirty="0">
-                <a:solidFill>
-                  <a:srgbClr val="008881"/>
-                </a:solidFill>
-                <a:uFill>
-                  <a:solidFill>
-                    <a:srgbClr val="008881"/>
-                  </a:solidFill>
-                </a:uFill>
-              </a:rPr>
-              <a:t>Diversity of </a:t>
-            </a:r>
-            <a:r>
-              <a:rPr lang="en-US" sz="3200" dirty="0" smtClean="0">
-                <a:solidFill>
-                  <a:srgbClr val="008881"/>
-                </a:solidFill>
-                <a:uFill>
-                  <a:solidFill>
-                    <a:srgbClr val="008881"/>
-                  </a:solidFill>
-                </a:uFill>
-              </a:rPr>
-              <a:t>cl</a:t>
-            </a:r>
-            <a:r>
-              <a:rPr sz="3200" dirty="0" smtClean="0">
-                <a:solidFill>
-                  <a:srgbClr val="008881"/>
-                </a:solidFill>
-                <a:uFill>
-                  <a:solidFill>
-                    <a:srgbClr val="008881"/>
-                  </a:solidFill>
-                </a:uFill>
-              </a:rPr>
-              <a:t>ients</a:t>
-            </a:r>
-            <a:r>
-              <a:rPr lang="en-US" sz="3200" dirty="0" smtClean="0">
-                <a:solidFill>
-                  <a:srgbClr val="008881"/>
-                </a:solidFill>
-                <a:uFill>
-                  <a:solidFill>
-                    <a:srgbClr val="008881"/>
-                  </a:solidFill>
-                </a:uFill>
-              </a:rPr>
-              <a:t>, more load</a:t>
-            </a:r>
-            <a:endParaRPr sz="3200" dirty="0">
-              <a:solidFill>
-                <a:srgbClr val="008881"/>
-              </a:solidFill>
-              <a:uFill>
-                <a:solidFill>
-                  <a:srgbClr val="008881"/>
-                </a:solidFill>
-              </a:uFill>
-            </a:endParaRPr>
-          </a:p>
-        </p:txBody>
-      </p:sp>
-      <p:sp>
-        <p:nvSpPr>
-          <p:cNvPr id="157" name="Shape 157"/>
-          <p:cNvSpPr>
-            <a:spLocks noGrp="1"/>
-          </p:cNvSpPr>
-          <p:nvPr>
-            <p:ph type="sldNum" sz="quarter" idx="4294967295"/>
-          </p:nvPr>
-        </p:nvSpPr>
-        <p:spPr>
-          <a:xfrm>
-            <a:off x="8553450" y="5021495"/>
-            <a:ext cx="533400" cy="127001"/>
-          </a:xfrm>
-          <a:prstGeom prst="rect">
-            <a:avLst/>
-          </a:prstGeom>
-          <a:extLst>
-            <a:ext uri="{C572A759-6A51-4108-AA02-DFA0A04FC94B}">
-              <ma14:wrappingTextBoxFlag xmlns:ma14="http://schemas.microsoft.com/office/mac/drawingml/2011/main" val="1"/>
-            </a:ext>
-          </a:extLst>
-        </p:spPr>
-        <p:txBody>
-          <a:bodyPr/>
-          <a:lstStyle/>
-          <a:p>
-            <a:pPr lvl="0">
-              <a:defRPr sz="1800">
-                <a:solidFill>
-                  <a:srgbClr val="000000"/>
-                </a:solidFill>
-                <a:uFillTx/>
-              </a:defRPr>
-            </a:pPr>
-            <a:fld id="{86CB4B4D-7CA3-9044-876B-883B54F8677D}" type="slidenum">
-              <a:rPr sz="800">
-                <a:solidFill>
-                  <a:srgbClr val="808080"/>
-                </a:solidFill>
-                <a:uFill>
-                  <a:solidFill>
-                    <a:srgbClr val="808080"/>
-                  </a:solidFill>
-                </a:uFill>
-              </a:rPr>
-              <a:t>16</a:t>
-            </a:fld>
-            <a:endParaRPr sz="800">
-              <a:solidFill>
-                <a:srgbClr val="808080"/>
-              </a:solidFill>
-              <a:uFill>
-                <a:solidFill>
-                  <a:srgbClr val="808080"/>
-                </a:solidFill>
-              </a:uFill>
-            </a:endParaRPr>
-          </a:p>
-        </p:txBody>
-      </p:sp>
-      <p:sp>
-        <p:nvSpPr>
-          <p:cNvPr id="158" name="Shape 158"/>
-          <p:cNvSpPr/>
-          <p:nvPr/>
-        </p:nvSpPr>
-        <p:spPr>
-          <a:xfrm>
-            <a:off x="479806" y="3673159"/>
-            <a:ext cx="6453047" cy="307777"/>
-          </a:xfrm>
-          <a:prstGeom prst="rect">
-            <a:avLst/>
-          </a:prstGeom>
-          <a:ln w="12700">
-            <a:miter lim="400000"/>
-          </a:ln>
-          <a:extLst>
-            <a:ext uri="{C572A759-6A51-4108-AA02-DFA0A04FC94B}">
-              <ma14:wrappingTextBoxFlag xmlns:ma14="http://schemas.microsoft.com/office/mac/drawingml/2011/main" val="1"/>
-            </a:ext>
-          </a:extLst>
-        </p:spPr>
-        <p:txBody>
-          <a:bodyPr wrap="none" lIns="45719" rIns="45719">
-            <a:spAutoFit/>
-          </a:bodyPr>
-          <a:lstStyle>
-            <a:lvl1pPr>
-              <a:defRPr>
-                <a:latin typeface="Avenir Next Regular"/>
-                <a:ea typeface="Avenir Next Regular"/>
-                <a:cs typeface="Avenir Next Regular"/>
-                <a:sym typeface="Avenir Next Regular"/>
-              </a:defRPr>
-            </a:lvl1pPr>
-          </a:lstStyle>
-          <a:p>
-            <a:pPr lvl="0">
-              <a:defRPr>
-                <a:solidFill>
-                  <a:srgbClr val="000000"/>
-                </a:solidFill>
-                <a:uFillTx/>
-              </a:defRPr>
-            </a:pPr>
-            <a:r>
-              <a:rPr dirty="0">
-                <a:solidFill>
-                  <a:srgbClr val="FFFFFF"/>
-                </a:solidFill>
-                <a:uFill>
-                  <a:solidFill>
-                    <a:srgbClr val="4D4D4D"/>
-                  </a:solidFill>
-                </a:uFill>
-              </a:rPr>
-              <a:t>http://money.cnn.com/2014/02/28/technology/mobile/mobile-apps-internet/</a:t>
-            </a:r>
-          </a:p>
-        </p:txBody>
-      </p:sp>
-      <p:sp>
-        <p:nvSpPr>
-          <p:cNvPr id="159" name="Shape 159"/>
-          <p:cNvSpPr/>
-          <p:nvPr/>
-        </p:nvSpPr>
-        <p:spPr>
-          <a:xfrm>
-            <a:off x="146481" y="1061400"/>
-            <a:ext cx="8673670" cy="523220"/>
-          </a:xfrm>
-          <a:prstGeom prst="rect">
-            <a:avLst/>
-          </a:prstGeom>
-          <a:ln w="12700">
-            <a:miter lim="400000"/>
-          </a:ln>
-          <a:extLst>
-            <a:ext uri="{C572A759-6A51-4108-AA02-DFA0A04FC94B}">
-              <ma14:wrappingTextBoxFlag xmlns:ma14="http://schemas.microsoft.com/office/mac/drawingml/2011/main" val="1"/>
-            </a:ext>
-          </a:extLst>
-        </p:spPr>
-        <p:txBody>
-          <a:bodyPr wrap="square" lIns="45719" rIns="45719">
-            <a:spAutoFit/>
-          </a:bodyPr>
-          <a:lstStyle>
-            <a:lvl1pPr algn="ctr">
-              <a:defRPr i="1">
-                <a:latin typeface="Avenir Next Regular"/>
-                <a:ea typeface="Avenir Next Regular"/>
-                <a:cs typeface="Avenir Next Regular"/>
-                <a:sym typeface="Avenir Next Regular"/>
-              </a:defRPr>
-            </a:lvl1pPr>
-          </a:lstStyle>
-          <a:p>
-            <a:pPr lvl="0">
-              <a:defRPr i="0">
-                <a:solidFill>
-                  <a:srgbClr val="000000"/>
-                </a:solidFill>
-                <a:uFillTx/>
-              </a:defRPr>
-            </a:pPr>
-            <a:r>
-              <a:rPr i="1" dirty="0">
-                <a:solidFill>
-                  <a:srgbClr val="FFFFFF"/>
-                </a:solidFill>
-                <a:uFill>
-                  <a:solidFill>
-                    <a:srgbClr val="4D4D4D"/>
-                  </a:solidFill>
-                </a:uFill>
-              </a:rPr>
-              <a:t>In January 2014, mobile devices accounted for 55% of Internet usage in the United States. Apps made up 47% of Internet traffic and 8% of traffic came from mobile browsers.</a:t>
-            </a:r>
-          </a:p>
-        </p:txBody>
-      </p:sp>
-    </p:spTree>
-    <p:extLst>
-      <p:ext uri="{BB962C8B-B14F-4D97-AF65-F5344CB8AC3E}">
-        <p14:creationId xmlns:p14="http://schemas.microsoft.com/office/powerpoint/2010/main" val="4075452009"/>
-      </p:ext>
-    </p:extLst>
-  </p:cSld>
-  <p:clrMapOvr>
-    <a:masterClrMapping/>
-  </p:clrMapOvr>
-  <mc:AlternateContent xmlns:mc="http://schemas.openxmlformats.org/markup-compatibility/2006" xmlns:p14="http://schemas.microsoft.com/office/powerpoint/2010/main">
-    <mc:Choice Requires="p14">
-      <p:transition p14:dur="0"/>
-    </mc:Choice>
-    <mc:Fallback xmlns="">
-      <p:transition xmlns:p14="http://schemas.microsoft.com/office/powerpoint/2010/main"/>
-    </mc:Fallback>
-  </mc:AlternateContent>
-  <p:timing>
-    <p:tnLst>
-      <p:par>
-        <p:cTn xmlns:p14="http://schemas.microsoft.com/office/powerpoint/2010/main" id="1" dur="indefinite" restart="never" nodeType="tmRoot"/>
-      </p:par>
-    </p:tnLst>
-  </p:timing>
-</p:sld>
-</file>
-
-<file path=ppt/slides/slide17.xml><?xml version="1.0" encoding="utf-8"?>
-<p:sld xmlns:a="http://schemas.openxmlformats.org/drawingml/2006/main" xmlns:r="http://schemas.openxmlformats.org/officeDocument/2006/relationships" xmlns:p="http://schemas.openxmlformats.org/presentationml/2006/main">
-  <p:cSld>
-    <p:spTree>
-      <p:nvGrpSpPr>
-        <p:cNvPr id="1" name=""/>
-        <p:cNvGrpSpPr/>
-        <p:nvPr/>
-      </p:nvGrpSpPr>
-      <p:grpSpPr>
-        <a:xfrm>
-          <a:off x="0" y="0"/>
-          <a:ext cx="0" cy="0"/>
-          <a:chOff x="0" y="0"/>
-          <a:chExt cx="0" cy="0"/>
-        </a:xfrm>
-      </p:grpSpPr>
-      <p:sp>
-        <p:nvSpPr>
-          <p:cNvPr id="2" name="Title 1"/>
-          <p:cNvSpPr>
-            <a:spLocks noGrp="1"/>
-          </p:cNvSpPr>
-          <p:nvPr>
-            <p:ph type="title"/>
-          </p:nvPr>
-        </p:nvSpPr>
-        <p:spPr>
-          <a:xfrm>
-            <a:off x="366713" y="241043"/>
-            <a:ext cx="8410575" cy="460375"/>
-          </a:xfrm>
-        </p:spPr>
-        <p:txBody>
-          <a:bodyPr/>
-          <a:lstStyle/>
-          <a:p>
-            <a:r>
-              <a:rPr lang="en-US" sz="2800" dirty="0">
-                <a:solidFill>
-                  <a:srgbClr val="2C95DD"/>
-                </a:solidFill>
-              </a:rPr>
-              <a:t>Pivotal</a:t>
-            </a:r>
-            <a:r>
-              <a:rPr lang="en-US" dirty="0" smtClean="0"/>
-              <a:t> </a:t>
-            </a:r>
-            <a:r>
-              <a:rPr lang="en-US" sz="2800" dirty="0">
-                <a:solidFill>
-                  <a:srgbClr val="2C95DD"/>
-                </a:solidFill>
-              </a:rPr>
-              <a:t>CF Mobile Services</a:t>
-            </a:r>
-            <a:endParaRPr lang="en-US" sz="2800" dirty="0">
-              <a:solidFill>
-                <a:srgbClr val="2C95DD"/>
-              </a:solidFill>
-            </a:endParaRPr>
-          </a:p>
-        </p:txBody>
-      </p:sp>
-      <p:pic>
-        <p:nvPicPr>
-          <p:cNvPr id="16" name="Content Placeholder 15" descr="tablet-phone.jpeg"/>
-          <p:cNvPicPr>
-            <a:picLocks noGrp="1" noChangeAspect="1"/>
-          </p:cNvPicPr>
-          <p:nvPr>
-            <p:ph sz="quarter" idx="4294967295"/>
-          </p:nvPr>
-        </p:nvPicPr>
-        <p:blipFill>
-          <a:blip r:embed="rId3" cstate="print">
-            <a:clrChange>
-              <a:clrFrom>
-                <a:srgbClr val="FFFFFF"/>
-              </a:clrFrom>
-              <a:clrTo>
-                <a:srgbClr val="FFFFFF">
-                  <a:alpha val="0"/>
-                </a:srgbClr>
-              </a:clrTo>
-            </a:clrChange>
-            <a:extLst>
-              <a:ext uri="{28A0092B-C50C-407E-A947-70E740481C1C}">
-                <a14:useLocalDpi xmlns:a14="http://schemas.microsoft.com/office/drawing/2010/main"/>
-              </a:ext>
-            </a:extLst>
-          </a:blip>
-          <a:srcRect l="-77933" r="-77933"/>
-          <a:stretch>
-            <a:fillRect/>
-          </a:stretch>
-        </p:blipFill>
-        <p:spPr>
-          <a:xfrm>
-            <a:off x="5562600" y="3486150"/>
-            <a:ext cx="2376487" cy="955888"/>
-          </a:xfrm>
-          <a:prstGeom prst="rect">
-            <a:avLst/>
-          </a:prstGeom>
-        </p:spPr>
-      </p:pic>
-      <p:sp>
-        <p:nvSpPr>
-          <p:cNvPr id="19" name="Rounded Rectangle 18"/>
-          <p:cNvSpPr/>
-          <p:nvPr/>
-        </p:nvSpPr>
-        <p:spPr>
-          <a:xfrm>
-            <a:off x="4724400" y="857250"/>
-            <a:ext cx="4165600" cy="381000"/>
-          </a:xfrm>
-          <a:prstGeom prst="roundRect">
-            <a:avLst/>
-          </a:prstGeom>
-          <a:solidFill>
-            <a:schemeClr val="bg1">
-              <a:lumMod val="85000"/>
-            </a:schemeClr>
-          </a:solidFill>
-          <a:ln w="12700">
-            <a:noFill/>
-          </a:ln>
-        </p:spPr>
-        <p:style>
-          <a:lnRef idx="2">
-            <a:schemeClr val="accent1">
-              <a:shade val="50000"/>
-            </a:schemeClr>
-          </a:lnRef>
-          <a:fillRef idx="1">
-            <a:schemeClr val="accent1"/>
-          </a:fillRef>
-          <a:effectRef idx="0">
-            <a:schemeClr val="accent1"/>
-          </a:effectRef>
-          <a:fontRef idx="minor">
-            <a:schemeClr val="lt1"/>
-          </a:fontRef>
-        </p:style>
-        <p:txBody>
-          <a:bodyPr lIns="91440" tIns="45720" rtlCol="0" anchor="t" anchorCtr="0"/>
-          <a:lstStyle/>
-          <a:p>
-            <a:pPr algn="ctr"/>
-            <a:r>
-              <a:rPr lang="en-US" sz="1600" dirty="0" smtClean="0">
-                <a:solidFill>
-                  <a:schemeClr val="accent5"/>
-                </a:solidFill>
-              </a:rPr>
-              <a:t>Enterprise Backend Applications</a:t>
-            </a:r>
-            <a:endParaRPr lang="en-US" sz="1600" dirty="0">
-              <a:solidFill>
-                <a:schemeClr val="accent5"/>
-              </a:solidFill>
-            </a:endParaRPr>
-          </a:p>
-        </p:txBody>
-      </p:sp>
-      <p:sp>
-        <p:nvSpPr>
-          <p:cNvPr id="20" name="Up-Down Arrow 19"/>
-          <p:cNvSpPr/>
-          <p:nvPr/>
-        </p:nvSpPr>
-        <p:spPr>
-          <a:xfrm>
-            <a:off x="6553200" y="1314450"/>
-            <a:ext cx="304800" cy="495300"/>
-          </a:xfrm>
-          <a:prstGeom prst="upDownArrow">
-            <a:avLst/>
-          </a:prstGeom>
-          <a:ln/>
-        </p:spPr>
-        <p:style>
-          <a:lnRef idx="1">
-            <a:schemeClr val="dk1"/>
-          </a:lnRef>
-          <a:fillRef idx="3">
-            <a:schemeClr val="dk1"/>
-          </a:fillRef>
-          <a:effectRef idx="2">
-            <a:schemeClr val="dk1"/>
-          </a:effectRef>
-          <a:fontRef idx="minor">
-            <a:schemeClr val="lt1"/>
-          </a:fontRef>
-        </p:style>
-        <p:txBody>
-          <a:bodyPr rtlCol="0" anchor="ctr"/>
-          <a:lstStyle/>
-          <a:p>
-            <a:pPr algn="ctr"/>
-            <a:endParaRPr lang="en-US"/>
-          </a:p>
-        </p:txBody>
-      </p:sp>
-      <p:sp>
-        <p:nvSpPr>
-          <p:cNvPr id="21" name="Up-Down Arrow 20"/>
-          <p:cNvSpPr/>
-          <p:nvPr/>
-        </p:nvSpPr>
-        <p:spPr>
-          <a:xfrm>
-            <a:off x="6553200" y="3028950"/>
-            <a:ext cx="304800" cy="440790"/>
-          </a:xfrm>
-          <a:prstGeom prst="upDownArrow">
-            <a:avLst/>
-          </a:prstGeom>
-          <a:ln/>
-        </p:spPr>
-        <p:style>
-          <a:lnRef idx="1">
-            <a:schemeClr val="dk1"/>
-          </a:lnRef>
-          <a:fillRef idx="3">
-            <a:schemeClr val="dk1"/>
-          </a:fillRef>
-          <a:effectRef idx="2">
-            <a:schemeClr val="dk1"/>
-          </a:effectRef>
-          <a:fontRef idx="minor">
-            <a:schemeClr val="lt1"/>
-          </a:fontRef>
-        </p:style>
-        <p:txBody>
-          <a:bodyPr rtlCol="0" anchor="ctr"/>
-          <a:lstStyle/>
-          <a:p>
-            <a:pPr algn="ctr"/>
-            <a:endParaRPr lang="en-US"/>
-          </a:p>
-        </p:txBody>
-      </p:sp>
-      <p:sp>
-        <p:nvSpPr>
-          <p:cNvPr id="22" name="Content Placeholder 2"/>
-          <p:cNvSpPr txBox="1">
-            <a:spLocks/>
-          </p:cNvSpPr>
-          <p:nvPr/>
-        </p:nvSpPr>
-        <p:spPr bwMode="gray">
-          <a:xfrm>
-            <a:off x="289858" y="919253"/>
-            <a:ext cx="4495800" cy="2819400"/>
-          </a:xfrm>
-          <a:prstGeom prst="rect">
-            <a:avLst/>
-          </a:prstGeom>
-          <a:noFill/>
-        </p:spPr>
-        <p:txBody>
-          <a:bodyPr lIns="0" tIns="0" rIns="0" bIns="0">
-            <a:noAutofit/>
-          </a:bodyPr>
-          <a:lstStyle>
-            <a:lvl1pPr marL="228600" indent="-228600" algn="l" defTabSz="914400" rtl="0" eaLnBrk="1" latinLnBrk="0" hangingPunct="1">
-              <a:spcBef>
-                <a:spcPts val="1200"/>
-              </a:spcBef>
-              <a:buClr>
-                <a:srgbClr val="ADC339"/>
-              </a:buClr>
-              <a:buFont typeface="Wingdings" pitchFamily="2" charset="2"/>
-              <a:buChar char=""/>
-              <a:defRPr sz="2400" kern="1200">
-                <a:solidFill>
-                  <a:schemeClr val="bg2"/>
-                </a:solidFill>
-                <a:latin typeface="Arial"/>
-                <a:ea typeface="+mn-ea"/>
-                <a:cs typeface="Arial"/>
-              </a:defRPr>
-            </a:lvl1pPr>
-            <a:lvl2pPr marL="742950" indent="-285750" algn="l" defTabSz="914400" rtl="0" eaLnBrk="1" latinLnBrk="0" hangingPunct="1">
-              <a:spcBef>
-                <a:spcPts val="300"/>
-              </a:spcBef>
-              <a:buClr>
-                <a:srgbClr val="ADC339"/>
-              </a:buClr>
-              <a:buFont typeface="Verdana" pitchFamily="34" charset="0"/>
-              <a:buChar char="–"/>
-              <a:defRPr sz="2000" kern="1200">
-                <a:solidFill>
-                  <a:schemeClr val="bg2"/>
-                </a:solidFill>
-                <a:latin typeface="Arial"/>
-                <a:ea typeface="+mn-ea"/>
-                <a:cs typeface="Arial"/>
-              </a:defRPr>
-            </a:lvl2pPr>
-            <a:lvl3pPr marL="1143000" indent="-228600" algn="l" defTabSz="914400" rtl="0" eaLnBrk="1" latinLnBrk="0" hangingPunct="1">
-              <a:spcBef>
-                <a:spcPts val="300"/>
-              </a:spcBef>
-              <a:buClr>
-                <a:srgbClr val="ADC339"/>
-              </a:buClr>
-              <a:buFont typeface="Verdana" pitchFamily="34" charset="0"/>
-              <a:buChar char="▪"/>
-              <a:defRPr sz="1600" kern="1200">
-                <a:solidFill>
-                  <a:schemeClr val="bg2"/>
-                </a:solidFill>
-                <a:latin typeface="Arial"/>
-                <a:ea typeface="+mn-ea"/>
-                <a:cs typeface="Arial"/>
-              </a:defRPr>
-            </a:lvl3pPr>
-            <a:lvl4pPr marL="1658938" indent="-287338" algn="l" defTabSz="914400" rtl="0" eaLnBrk="1" latinLnBrk="0" hangingPunct="1">
-              <a:spcBef>
-                <a:spcPts val="300"/>
-              </a:spcBef>
-              <a:buClr>
-                <a:srgbClr val="ADC339"/>
-              </a:buClr>
-              <a:buFont typeface="Verdana" pitchFamily="34" charset="0"/>
-              <a:buChar char="—"/>
-              <a:defRPr sz="1200" kern="1200">
-                <a:solidFill>
-                  <a:schemeClr val="bg2"/>
-                </a:solidFill>
-                <a:latin typeface="Arial"/>
-                <a:ea typeface="+mn-ea"/>
-                <a:cs typeface="Arial"/>
-              </a:defRPr>
-            </a:lvl4pPr>
-            <a:lvl5pPr marL="2057400" indent="-228600" algn="l" defTabSz="914400" rtl="0" eaLnBrk="1" latinLnBrk="0" hangingPunct="1">
-              <a:spcBef>
-                <a:spcPts val="300"/>
-              </a:spcBef>
-              <a:buClr>
-                <a:srgbClr val="ADC339"/>
-              </a:buClr>
-              <a:buFont typeface="Verdana" pitchFamily="34" charset="0"/>
-              <a:buChar char="»"/>
-              <a:defRPr sz="1100" kern="1200">
-                <a:solidFill>
-                  <a:schemeClr val="bg2"/>
-                </a:solidFill>
-                <a:latin typeface="Arial"/>
-                <a:ea typeface="+mn-ea"/>
-                <a:cs typeface="Arial"/>
-              </a:defRPr>
-            </a:lvl5pPr>
-            <a:lvl6pPr marL="2514600" indent="-228600" algn="l" defTabSz="914400" rtl="0" eaLnBrk="1" latinLnBrk="0" hangingPunct="1">
-              <a:spcBef>
-                <a:spcPct val="20000"/>
-              </a:spcBef>
-              <a:buFont typeface="Arial" pitchFamily="34" charset="0"/>
-              <a:buChar char="•"/>
-              <a:defRPr sz="2000" kern="1200">
-                <a:solidFill>
-                  <a:schemeClr val="tx1"/>
-                </a:solidFill>
-                <a:latin typeface="+mn-lt"/>
-                <a:ea typeface="+mn-ea"/>
-                <a:cs typeface="+mn-cs"/>
-              </a:defRPr>
-            </a:lvl6pPr>
-            <a:lvl7pPr marL="2971800" indent="-228600" algn="l" defTabSz="914400" rtl="0" eaLnBrk="1" latinLnBrk="0" hangingPunct="1">
-              <a:spcBef>
-                <a:spcPct val="20000"/>
-              </a:spcBef>
-              <a:buFont typeface="Arial" pitchFamily="34" charset="0"/>
-              <a:buChar char="•"/>
-              <a:defRPr sz="2000" kern="1200">
-                <a:solidFill>
-                  <a:schemeClr val="tx1"/>
-                </a:solidFill>
-                <a:latin typeface="+mn-lt"/>
-                <a:ea typeface="+mn-ea"/>
-                <a:cs typeface="+mn-cs"/>
-              </a:defRPr>
-            </a:lvl7pPr>
-            <a:lvl8pPr marL="3429000" indent="-228600" algn="l" defTabSz="914400" rtl="0" eaLnBrk="1" latinLnBrk="0" hangingPunct="1">
-              <a:spcBef>
-                <a:spcPct val="20000"/>
-              </a:spcBef>
-              <a:buFont typeface="Arial" pitchFamily="34" charset="0"/>
-              <a:buChar char="•"/>
-              <a:defRPr sz="2000" kern="1200">
-                <a:solidFill>
-                  <a:schemeClr val="tx1"/>
-                </a:solidFill>
-                <a:latin typeface="+mn-lt"/>
-                <a:ea typeface="+mn-ea"/>
-                <a:cs typeface="+mn-cs"/>
-              </a:defRPr>
-            </a:lvl8pPr>
-            <a:lvl9pPr marL="3886200" indent="-228600" algn="l" defTabSz="914400" rtl="0" eaLnBrk="1" latinLnBrk="0" hangingPunct="1">
-              <a:spcBef>
-                <a:spcPct val="20000"/>
-              </a:spcBef>
-              <a:buFont typeface="Arial" pitchFamily="34" charset="0"/>
-              <a:buChar char="•"/>
-              <a:defRPr sz="2000" kern="1200">
-                <a:solidFill>
-                  <a:schemeClr val="tx1"/>
-                </a:solidFill>
-                <a:latin typeface="+mn-lt"/>
-                <a:ea typeface="+mn-ea"/>
-                <a:cs typeface="+mn-cs"/>
-              </a:defRPr>
-            </a:lvl9pPr>
-          </a:lstStyle>
-          <a:p>
-            <a:pPr>
-              <a:spcBef>
-                <a:spcPts val="0"/>
-              </a:spcBef>
-              <a:spcAft>
-                <a:spcPts val="600"/>
-              </a:spcAft>
-            </a:pPr>
-            <a:r>
-              <a:rPr lang="en-US" sz="2000" dirty="0" smtClean="0">
-                <a:solidFill>
-                  <a:srgbClr val="FFFFFF"/>
-                </a:solidFill>
-              </a:rPr>
-              <a:t>Consumer-grade, mobile backend services built for the enterprise</a:t>
-            </a:r>
-          </a:p>
-          <a:p>
-            <a:pPr lvl="0">
-              <a:spcBef>
-                <a:spcPts val="0"/>
-              </a:spcBef>
-              <a:spcAft>
-                <a:spcPts val="600"/>
-              </a:spcAft>
-            </a:pPr>
-            <a:r>
-              <a:rPr lang="en-US" sz="2000" dirty="0">
-                <a:solidFill>
-                  <a:srgbClr val="FFFFFF"/>
-                </a:solidFill>
-              </a:rPr>
-              <a:t>Built on Pivotal CF for simplified </a:t>
-            </a:r>
-            <a:r>
-              <a:rPr lang="en-US" sz="2000" dirty="0" smtClean="0">
-                <a:solidFill>
-                  <a:srgbClr val="FFFFFF"/>
-                </a:solidFill>
-              </a:rPr>
-              <a:t>deployment </a:t>
-            </a:r>
-            <a:r>
-              <a:rPr lang="en-US" sz="2000" dirty="0">
-                <a:solidFill>
-                  <a:srgbClr val="FFFFFF"/>
-                </a:solidFill>
-              </a:rPr>
-              <a:t>and operation </a:t>
-            </a:r>
-            <a:r>
-              <a:rPr lang="en-US" sz="2000" dirty="0" smtClean="0">
-                <a:solidFill>
-                  <a:srgbClr val="FFFFFF"/>
-                </a:solidFill>
-              </a:rPr>
-              <a:t>in private cloud</a:t>
-            </a:r>
-            <a:endParaRPr lang="en-US" sz="2000" dirty="0">
-              <a:solidFill>
-                <a:srgbClr val="FFFFFF"/>
-              </a:solidFill>
-            </a:endParaRPr>
-          </a:p>
-          <a:p>
-            <a:pPr lvl="0">
-              <a:spcBef>
-                <a:spcPts val="0"/>
-              </a:spcBef>
-              <a:spcAft>
-                <a:spcPts val="600"/>
-              </a:spcAft>
-            </a:pPr>
-            <a:r>
-              <a:rPr lang="en-US" sz="2000" dirty="0">
-                <a:solidFill>
-                  <a:srgbClr val="FFFFFF"/>
-                </a:solidFill>
-              </a:rPr>
-              <a:t>Enables businesses to apply the power of </a:t>
-            </a:r>
-            <a:r>
-              <a:rPr lang="en-US" sz="2000" dirty="0" err="1">
-                <a:solidFill>
-                  <a:srgbClr val="FFFFFF"/>
-                </a:solidFill>
-              </a:rPr>
-              <a:t>Pivotal’s</a:t>
-            </a:r>
-            <a:r>
-              <a:rPr lang="en-US" sz="2000" dirty="0">
-                <a:solidFill>
-                  <a:srgbClr val="FFFFFF"/>
-                </a:solidFill>
-              </a:rPr>
-              <a:t> Big Data Suite to mobile solutions </a:t>
-            </a:r>
-          </a:p>
-          <a:p>
-            <a:pPr>
-              <a:spcBef>
-                <a:spcPts val="0"/>
-              </a:spcBef>
-              <a:spcAft>
-                <a:spcPts val="600"/>
-              </a:spcAft>
-            </a:pPr>
-            <a:endParaRPr lang="en-US" sz="2000" dirty="0" smtClean="0">
-              <a:solidFill>
-                <a:srgbClr val="FFFFFF"/>
-              </a:solidFill>
-            </a:endParaRPr>
-          </a:p>
-        </p:txBody>
-      </p:sp>
-      <p:sp>
-        <p:nvSpPr>
-          <p:cNvPr id="13" name="Rounded Rectangle 12"/>
-          <p:cNvSpPr/>
-          <p:nvPr/>
-        </p:nvSpPr>
-        <p:spPr>
-          <a:xfrm>
-            <a:off x="4724400" y="1885950"/>
-            <a:ext cx="4165600" cy="762000"/>
-          </a:xfrm>
-          <a:prstGeom prst="roundRect">
-            <a:avLst>
-              <a:gd name="adj" fmla="val 9429"/>
-            </a:avLst>
-          </a:prstGeom>
-          <a:solidFill>
-            <a:schemeClr val="bg1">
-              <a:lumMod val="85000"/>
-            </a:schemeClr>
-          </a:solidFill>
-          <a:ln w="12700">
-            <a:noFill/>
-          </a:ln>
-        </p:spPr>
-        <p:style>
-          <a:lnRef idx="2">
-            <a:schemeClr val="accent1">
-              <a:shade val="50000"/>
-            </a:schemeClr>
-          </a:lnRef>
-          <a:fillRef idx="1">
-            <a:schemeClr val="accent1"/>
-          </a:fillRef>
-          <a:effectRef idx="0">
-            <a:schemeClr val="accent1"/>
-          </a:effectRef>
-          <a:fontRef idx="minor">
-            <a:schemeClr val="lt1"/>
-          </a:fontRef>
-        </p:style>
-        <p:txBody>
-          <a:bodyPr lIns="0" tIns="0" rtlCol="0" anchor="t" anchorCtr="0"/>
-          <a:lstStyle/>
-          <a:p>
-            <a:pPr algn="ctr"/>
-            <a:r>
-              <a:rPr lang="en-US" sz="1200" dirty="0" smtClean="0">
-                <a:solidFill>
-                  <a:schemeClr val="accent5"/>
-                </a:solidFill>
-              </a:rPr>
-              <a:t>Pivotal CF Mobile Services</a:t>
-            </a:r>
-            <a:endParaRPr lang="en-US" sz="1200" dirty="0">
-              <a:solidFill>
-                <a:schemeClr val="accent5"/>
-              </a:solidFill>
-            </a:endParaRPr>
-          </a:p>
-        </p:txBody>
-      </p:sp>
-      <p:sp>
-        <p:nvSpPr>
-          <p:cNvPr id="14" name="Rounded Rectangle 13"/>
-          <p:cNvSpPr/>
-          <p:nvPr/>
-        </p:nvSpPr>
-        <p:spPr>
-          <a:xfrm>
-            <a:off x="4876800" y="2190750"/>
-            <a:ext cx="914400" cy="405826"/>
-          </a:xfrm>
-          <a:prstGeom prst="roundRect">
-            <a:avLst/>
-          </a:prstGeom>
-          <a:solidFill>
-            <a:schemeClr val="tx1"/>
-          </a:solidFill>
-          <a:ln w="12700">
-            <a:noFill/>
-          </a:ln>
-        </p:spPr>
-        <p:style>
-          <a:lnRef idx="2">
-            <a:schemeClr val="accent1">
-              <a:shade val="50000"/>
-            </a:schemeClr>
-          </a:lnRef>
-          <a:fillRef idx="1">
-            <a:schemeClr val="accent1"/>
-          </a:fillRef>
-          <a:effectRef idx="0">
-            <a:schemeClr val="accent1"/>
-          </a:effectRef>
-          <a:fontRef idx="minor">
-            <a:schemeClr val="lt1"/>
-          </a:fontRef>
-        </p:style>
-        <p:txBody>
-          <a:bodyPr rtlCol="0" anchor="ctr"/>
-          <a:lstStyle/>
-          <a:p>
-            <a:pPr algn="ctr"/>
-            <a:r>
-              <a:rPr lang="en-US" sz="1000" dirty="0" smtClean="0"/>
-              <a:t>Push</a:t>
-            </a:r>
-          </a:p>
-          <a:p>
-            <a:pPr algn="ctr"/>
-            <a:r>
-              <a:rPr lang="en-US" sz="1000" dirty="0" smtClean="0"/>
-              <a:t>Notifications</a:t>
-            </a:r>
-            <a:endParaRPr lang="en-US" sz="1000" dirty="0"/>
-          </a:p>
-        </p:txBody>
-      </p:sp>
-      <p:sp>
-        <p:nvSpPr>
-          <p:cNvPr id="15" name="Rounded Rectangle 14"/>
-          <p:cNvSpPr/>
-          <p:nvPr/>
-        </p:nvSpPr>
-        <p:spPr>
-          <a:xfrm>
-            <a:off x="5867400" y="2190750"/>
-            <a:ext cx="914400" cy="381000"/>
-          </a:xfrm>
-          <a:prstGeom prst="roundRect">
-            <a:avLst/>
-          </a:prstGeom>
-          <a:solidFill>
-            <a:schemeClr val="tx1"/>
-          </a:solidFill>
-          <a:ln w="12700">
-            <a:noFill/>
-          </a:ln>
-        </p:spPr>
-        <p:style>
-          <a:lnRef idx="2">
-            <a:schemeClr val="accent1">
-              <a:shade val="50000"/>
-            </a:schemeClr>
-          </a:lnRef>
-          <a:fillRef idx="1">
-            <a:schemeClr val="accent1"/>
-          </a:fillRef>
-          <a:effectRef idx="0">
-            <a:schemeClr val="accent1"/>
-          </a:effectRef>
-          <a:fontRef idx="minor">
-            <a:schemeClr val="lt1"/>
-          </a:fontRef>
-        </p:style>
-        <p:txBody>
-          <a:bodyPr rtlCol="0" anchor="ctr"/>
-          <a:lstStyle/>
-          <a:p>
-            <a:pPr algn="ctr"/>
-            <a:r>
-              <a:rPr lang="en-US" sz="1000" dirty="0" smtClean="0"/>
-              <a:t>API</a:t>
-            </a:r>
-          </a:p>
-          <a:p>
-            <a:pPr algn="ctr"/>
-            <a:r>
-              <a:rPr lang="en-US" sz="1000" dirty="0" smtClean="0"/>
-              <a:t>Gateway</a:t>
-            </a:r>
-            <a:endParaRPr lang="en-US" sz="1000" dirty="0"/>
-          </a:p>
-        </p:txBody>
-      </p:sp>
-      <p:sp>
-        <p:nvSpPr>
-          <p:cNvPr id="26" name="Rounded Rectangle 25"/>
-          <p:cNvSpPr/>
-          <p:nvPr/>
-        </p:nvSpPr>
-        <p:spPr>
-          <a:xfrm>
-            <a:off x="6858000" y="2190750"/>
-            <a:ext cx="914400" cy="381000"/>
-          </a:xfrm>
-          <a:prstGeom prst="roundRect">
-            <a:avLst/>
-          </a:prstGeom>
-          <a:solidFill>
-            <a:schemeClr val="tx1"/>
-          </a:solidFill>
-          <a:ln w="12700">
-            <a:noFill/>
-          </a:ln>
-        </p:spPr>
-        <p:style>
-          <a:lnRef idx="2">
-            <a:schemeClr val="accent1">
-              <a:shade val="50000"/>
-            </a:schemeClr>
-          </a:lnRef>
-          <a:fillRef idx="1">
-            <a:schemeClr val="accent1"/>
-          </a:fillRef>
-          <a:effectRef idx="0">
-            <a:schemeClr val="accent1"/>
-          </a:effectRef>
-          <a:fontRef idx="minor">
-            <a:schemeClr val="lt1"/>
-          </a:fontRef>
-        </p:style>
-        <p:txBody>
-          <a:bodyPr rtlCol="0" anchor="ctr"/>
-          <a:lstStyle/>
-          <a:p>
-            <a:pPr algn="ctr"/>
-            <a:r>
-              <a:rPr lang="en-US" sz="1000" dirty="0" smtClean="0"/>
-              <a:t>Data</a:t>
-            </a:r>
-          </a:p>
-          <a:p>
-            <a:pPr algn="ctr"/>
-            <a:r>
-              <a:rPr lang="en-US" sz="1000" dirty="0" smtClean="0"/>
-              <a:t>Sync</a:t>
-            </a:r>
-            <a:endParaRPr lang="en-US" sz="1000" dirty="0"/>
-          </a:p>
-        </p:txBody>
-      </p:sp>
-      <p:sp>
-        <p:nvSpPr>
-          <p:cNvPr id="12" name="Rounded Rectangle 11"/>
-          <p:cNvSpPr/>
-          <p:nvPr/>
-        </p:nvSpPr>
-        <p:spPr>
-          <a:xfrm>
-            <a:off x="4724400" y="2724150"/>
-            <a:ext cx="4142442" cy="253426"/>
-          </a:xfrm>
-          <a:prstGeom prst="roundRect">
-            <a:avLst>
-              <a:gd name="adj" fmla="val 9429"/>
-            </a:avLst>
-          </a:prstGeom>
-          <a:solidFill>
-            <a:schemeClr val="bg1">
-              <a:lumMod val="85000"/>
-            </a:schemeClr>
-          </a:solidFill>
-          <a:ln w="12700">
-            <a:noFill/>
-          </a:ln>
-        </p:spPr>
-        <p:style>
-          <a:lnRef idx="2">
-            <a:schemeClr val="accent1">
-              <a:shade val="50000"/>
-            </a:schemeClr>
-          </a:lnRef>
-          <a:fillRef idx="1">
-            <a:schemeClr val="accent1"/>
-          </a:fillRef>
-          <a:effectRef idx="0">
-            <a:schemeClr val="accent1"/>
-          </a:effectRef>
-          <a:fontRef idx="minor">
-            <a:schemeClr val="lt1"/>
-          </a:fontRef>
-        </p:style>
-        <p:txBody>
-          <a:bodyPr lIns="0" tIns="0" rtlCol="0" anchor="t" anchorCtr="0"/>
-          <a:lstStyle/>
-          <a:p>
-            <a:pPr algn="ctr"/>
-            <a:r>
-              <a:rPr lang="en-US" sz="1200" dirty="0" smtClean="0">
-                <a:solidFill>
-                  <a:schemeClr val="accent5"/>
-                </a:solidFill>
-              </a:rPr>
-              <a:t>Pivotal CF</a:t>
-            </a:r>
-            <a:endParaRPr lang="en-US" sz="1200" dirty="0">
-              <a:solidFill>
-                <a:schemeClr val="accent5"/>
-              </a:solidFill>
-            </a:endParaRPr>
-          </a:p>
-        </p:txBody>
-      </p:sp>
-      <p:sp>
-        <p:nvSpPr>
-          <p:cNvPr id="17" name="Rounded Rectangle 16"/>
-          <p:cNvSpPr/>
-          <p:nvPr/>
-        </p:nvSpPr>
-        <p:spPr>
-          <a:xfrm>
-            <a:off x="7848600" y="2190750"/>
-            <a:ext cx="914400" cy="381000"/>
-          </a:xfrm>
-          <a:prstGeom prst="roundRect">
-            <a:avLst/>
-          </a:prstGeom>
-          <a:solidFill>
-            <a:schemeClr val="tx1"/>
-          </a:solidFill>
-          <a:ln w="12700">
-            <a:noFill/>
-          </a:ln>
-        </p:spPr>
-        <p:style>
-          <a:lnRef idx="2">
-            <a:schemeClr val="accent1">
-              <a:shade val="50000"/>
-            </a:schemeClr>
-          </a:lnRef>
-          <a:fillRef idx="1">
-            <a:schemeClr val="accent1"/>
-          </a:fillRef>
-          <a:effectRef idx="0">
-            <a:schemeClr val="accent1"/>
-          </a:effectRef>
-          <a:fontRef idx="minor">
-            <a:schemeClr val="lt1"/>
-          </a:fontRef>
-        </p:style>
-        <p:txBody>
-          <a:bodyPr rtlCol="0" anchor="ctr"/>
-          <a:lstStyle/>
-          <a:p>
-            <a:pPr algn="ctr"/>
-            <a:r>
-              <a:rPr lang="en-US" sz="1000" dirty="0" smtClean="0"/>
-              <a:t>App</a:t>
-            </a:r>
-          </a:p>
-          <a:p>
-            <a:pPr algn="ctr"/>
-            <a:r>
-              <a:rPr lang="en-US" sz="1000" dirty="0" smtClean="0"/>
-              <a:t>Distribution</a:t>
-            </a:r>
-            <a:endParaRPr lang="en-US" sz="1000" dirty="0"/>
-          </a:p>
-        </p:txBody>
-      </p:sp>
-    </p:spTree>
-    <p:extLst>
-      <p:ext uri="{BB962C8B-B14F-4D97-AF65-F5344CB8AC3E}">
-        <p14:creationId xmlns:p14="http://schemas.microsoft.com/office/powerpoint/2010/main" val="2292891630"/>
-      </p:ext>
-    </p:extLst>
-  </p:cSld>
-  <p:clrMapOvr>
-    <a:masterClrMapping/>
-  </p:clrMapOvr>
-  <mc:AlternateContent xmlns:mc="http://schemas.openxmlformats.org/markup-compatibility/2006">
-    <mc:Choice xmlns:p14="http://schemas.microsoft.com/office/powerpoint/2010/main" Requires="p14">
-      <p:transition spd="slow" p14:dur="2000"/>
-    </mc:Choice>
-    <mc:Fallback>
-      <p:transition xmlns:p14="http://schemas.microsoft.com/office/powerpoint/2010/main" spd="slow"/>
-    </mc:Fallback>
-  </mc:AlternateContent>
-  <p:timing>
-    <p:tnLst>
-      <p:par>
-        <p:cTn xmlns:p14="http://schemas.microsoft.com/office/powerpoint/2010/main" id="1" dur="indefinite" restart="never" nodeType="tmRoot"/>
-      </p:par>
-    </p:tnLst>
-  </p:timing>
-</p:sld>
-</file>
-
-<file path=ppt/slides/slide18.xml><?xml version="1.0" encoding="utf-8"?>
 <p:sld xmlns:a="http://schemas.openxmlformats.org/drawingml/2006/main" xmlns:r="http://schemas.openxmlformats.org/officeDocument/2006/relationships" xmlns:p="http://schemas.openxmlformats.org/presentationml/2006/main">
   <p:cSld>
     <p:spTree>
@@ -11399,11 +9403,6 @@
               </a:rPr>
               <a:t>Notifications</a:t>
             </a:r>
-            <a:endParaRPr lang="en-US" sz="2800" dirty="0">
-              <a:solidFill>
-                <a:srgbClr val="2C95DD"/>
-              </a:solidFill>
-            </a:endParaRPr>
           </a:p>
         </p:txBody>
       </p:sp>
@@ -11524,15 +9523,7 @@
                   <a:srgbClr val="FFFFFF"/>
                 </a:solidFill>
               </a:rPr>
-              <a:t> push providers with services behind the </a:t>
-            </a:r>
-            <a:r>
-              <a:rPr lang="en-US" sz="1800" dirty="0" smtClean="0">
-                <a:solidFill>
-                  <a:srgbClr val="FFFFFF"/>
-                </a:solidFill>
-              </a:rPr>
-              <a:t>firewall</a:t>
+              <a:t> push providers with services behind the firewall</a:t>
             </a:r>
           </a:p>
           <a:p>
@@ -11655,282 +9646,11 @@
   <p:clrMapOvr>
     <a:masterClrMapping/>
   </p:clrMapOvr>
-  <mc:AlternateContent xmlns:mc="http://schemas.openxmlformats.org/markup-compatibility/2006">
-    <mc:Choice xmlns:p14="http://schemas.microsoft.com/office/powerpoint/2010/main" Requires="p14">
+  <mc:AlternateContent xmlns:mc="http://schemas.openxmlformats.org/markup-compatibility/2006" xmlns:p14="http://schemas.microsoft.com/office/powerpoint/2010/main">
+    <mc:Choice Requires="p14">
       <p:transition spd="slow" p14:dur="2000"/>
     </mc:Choice>
-    <mc:Fallback>
-      <p:transition xmlns:p14="http://schemas.microsoft.com/office/powerpoint/2010/main" spd="slow"/>
-    </mc:Fallback>
-  </mc:AlternateContent>
-  <p:timing>
-    <p:tnLst>
-      <p:par>
-        <p:cTn xmlns:p14="http://schemas.microsoft.com/office/powerpoint/2010/main" id="1" dur="indefinite" restart="never" nodeType="tmRoot"/>
-      </p:par>
-    </p:tnLst>
-  </p:timing>
-</p:sld>
-</file>
-
-<file path=ppt/slides/slide19.xml><?xml version="1.0" encoding="utf-8"?>
-<p:sld xmlns:a="http://schemas.openxmlformats.org/drawingml/2006/main" xmlns:r="http://schemas.openxmlformats.org/officeDocument/2006/relationships" xmlns:p="http://schemas.openxmlformats.org/presentationml/2006/main">
-  <p:cSld>
-    <p:spTree>
-      <p:nvGrpSpPr>
-        <p:cNvPr id="1" name=""/>
-        <p:cNvGrpSpPr/>
-        <p:nvPr/>
-      </p:nvGrpSpPr>
-      <p:grpSpPr>
-        <a:xfrm>
-          <a:off x="0" y="0"/>
-          <a:ext cx="0" cy="0"/>
-          <a:chOff x="0" y="0"/>
-          <a:chExt cx="0" cy="0"/>
-        </a:xfrm>
-      </p:grpSpPr>
-      <p:sp>
-        <p:nvSpPr>
-          <p:cNvPr id="2" name="Title 1"/>
-          <p:cNvSpPr>
-            <a:spLocks noGrp="1"/>
-          </p:cNvSpPr>
-          <p:nvPr>
-            <p:ph type="title"/>
-          </p:nvPr>
-        </p:nvSpPr>
-        <p:spPr/>
-        <p:txBody>
-          <a:bodyPr/>
-          <a:lstStyle/>
-          <a:p>
-            <a:r>
-              <a:rPr lang="en-US" sz="2800" dirty="0">
-                <a:solidFill>
-                  <a:srgbClr val="2C95DD"/>
-                </a:solidFill>
-              </a:rPr>
-              <a:t>Data</a:t>
-            </a:r>
-            <a:r>
-              <a:rPr lang="en-US" dirty="0" smtClean="0"/>
-              <a:t> </a:t>
-            </a:r>
-            <a:r>
-              <a:rPr lang="en-US" sz="2800" dirty="0">
-                <a:solidFill>
-                  <a:srgbClr val="2C95DD"/>
-                </a:solidFill>
-              </a:rPr>
-              <a:t>Sync</a:t>
-            </a:r>
-            <a:endParaRPr lang="en-US" sz="2800" dirty="0">
-              <a:solidFill>
-                <a:srgbClr val="2C95DD"/>
-              </a:solidFill>
-            </a:endParaRPr>
-          </a:p>
-        </p:txBody>
-      </p:sp>
-      <p:sp>
-        <p:nvSpPr>
-          <p:cNvPr id="3" name="Content Placeholder 2"/>
-          <p:cNvSpPr>
-            <a:spLocks noGrp="1"/>
-          </p:cNvSpPr>
-          <p:nvPr>
-            <p:ph sz="quarter" idx="4294967295"/>
-          </p:nvPr>
-        </p:nvSpPr>
-        <p:spPr>
-          <a:xfrm>
-            <a:off x="366716" y="898980"/>
-            <a:ext cx="6457960" cy="3382962"/>
-          </a:xfrm>
-          <a:prstGeom prst="rect">
-            <a:avLst/>
-          </a:prstGeom>
-        </p:spPr>
-        <p:txBody>
-          <a:bodyPr/>
-          <a:lstStyle/>
-          <a:p>
-            <a:r>
-              <a:rPr lang="en-US" sz="2000" dirty="0" smtClean="0">
-                <a:solidFill>
-                  <a:srgbClr val="FFFFFF"/>
-                </a:solidFill>
-              </a:rPr>
-              <a:t>Problem</a:t>
-            </a:r>
-          </a:p>
-          <a:p>
-            <a:pPr marL="285750" lvl="1" indent="-285750">
-              <a:buFont typeface="Arial"/>
-              <a:buChar char="•"/>
-            </a:pPr>
-            <a:r>
-              <a:rPr lang="en-US" sz="1800" dirty="0">
-                <a:solidFill>
-                  <a:srgbClr val="FFFFFF"/>
-                </a:solidFill>
-              </a:rPr>
-              <a:t>Apps</a:t>
-            </a:r>
-            <a:r>
-              <a:rPr lang="en-US" sz="1800" dirty="0" smtClean="0">
-                <a:solidFill>
-                  <a:srgbClr val="FFFFFF"/>
-                </a:solidFill>
-              </a:rPr>
-              <a:t> </a:t>
-            </a:r>
-            <a:r>
-              <a:rPr lang="en-US" sz="1800" dirty="0">
-                <a:solidFill>
-                  <a:srgbClr val="FFFFFF"/>
-                </a:solidFill>
-              </a:rPr>
-              <a:t>need to store mobile-specific data, but the existing backend cannot accommodate </a:t>
-            </a:r>
-          </a:p>
-          <a:p>
-            <a:pPr marL="285750" lvl="1" indent="-285750">
-              <a:buFont typeface="Arial"/>
-              <a:buChar char="•"/>
-            </a:pPr>
-            <a:r>
-              <a:rPr lang="en-US" sz="1800" dirty="0" smtClean="0">
-                <a:solidFill>
-                  <a:srgbClr val="FFFFFF"/>
-                </a:solidFill>
-              </a:rPr>
-              <a:t>Data sync / store is difficult for an app developer to set up</a:t>
-            </a:r>
-          </a:p>
-          <a:p>
-            <a:pPr marL="285750" lvl="1" indent="-285750">
-              <a:buFont typeface="Arial"/>
-              <a:buChar char="•"/>
-            </a:pPr>
-            <a:r>
-              <a:rPr lang="en-US" sz="1800" dirty="0" smtClean="0">
-                <a:solidFill>
-                  <a:srgbClr val="FFFFFF"/>
-                </a:solidFill>
-              </a:rPr>
-              <a:t>Existing services provide public cloud “black box” </a:t>
-            </a:r>
-            <a:r>
-              <a:rPr lang="en-US" sz="1800" dirty="0" smtClean="0">
-                <a:solidFill>
-                  <a:srgbClr val="FFFFFF"/>
-                </a:solidFill>
-              </a:rPr>
-              <a:t>storage</a:t>
-            </a:r>
-          </a:p>
-          <a:p>
-            <a:pPr lvl="1"/>
-            <a:endParaRPr lang="en-US" sz="1800" dirty="0" smtClean="0">
-              <a:solidFill>
-                <a:srgbClr val="FFFFFF"/>
-              </a:solidFill>
-            </a:endParaRPr>
-          </a:p>
-          <a:p>
-            <a:r>
-              <a:rPr lang="en-US" sz="2000" dirty="0">
-                <a:solidFill>
-                  <a:srgbClr val="FFFFFF"/>
-                </a:solidFill>
-              </a:rPr>
-              <a:t>Solution / Benefits</a:t>
-            </a:r>
-          </a:p>
-          <a:p>
-            <a:pPr marL="285750" lvl="1" indent="-285750">
-              <a:buFont typeface="Arial"/>
-              <a:buChar char="•"/>
-            </a:pPr>
-            <a:r>
-              <a:rPr lang="en-US" sz="1800" dirty="0">
-                <a:solidFill>
-                  <a:srgbClr val="FFFFFF"/>
-                </a:solidFill>
-              </a:rPr>
-              <a:t>Mobile-optimized API for access to multiple types of storage </a:t>
-            </a:r>
-          </a:p>
-          <a:p>
-            <a:pPr marL="285750" lvl="1" indent="-285750">
-              <a:buFont typeface="Arial"/>
-              <a:buChar char="•"/>
-            </a:pPr>
-            <a:r>
-              <a:rPr lang="en-US" sz="1800" dirty="0">
-                <a:solidFill>
-                  <a:srgbClr val="FFFFFF"/>
-                </a:solidFill>
-              </a:rPr>
-              <a:t>Simple for developers, yet enterprise-grade and highly scalable</a:t>
-            </a:r>
-          </a:p>
-          <a:p>
-            <a:endParaRPr lang="en-US" sz="2200" dirty="0" smtClean="0">
-              <a:solidFill>
-                <a:srgbClr val="FFFFFF"/>
-              </a:solidFill>
-            </a:endParaRPr>
-          </a:p>
-        </p:txBody>
-      </p:sp>
-      <p:pic>
-        <p:nvPicPr>
-          <p:cNvPr id="5" name="Picture 4" descr="settings.png"/>
-          <p:cNvPicPr>
-            <a:picLocks noChangeAspect="1"/>
-          </p:cNvPicPr>
-          <p:nvPr/>
-        </p:nvPicPr>
-        <p:blipFill>
-          <a:blip r:embed="rId3">
-            <a:extLst>
-              <a:ext uri="{28A0092B-C50C-407E-A947-70E740481C1C}">
-                <a14:useLocalDpi xmlns:a14="http://schemas.microsoft.com/office/drawing/2010/main" val="0"/>
-              </a:ext>
-            </a:extLst>
-          </a:blip>
-          <a:stretch>
-            <a:fillRect/>
-          </a:stretch>
-        </p:blipFill>
-        <p:spPr>
-          <a:xfrm>
-            <a:off x="7162800" y="742950"/>
-            <a:ext cx="1600200" cy="3378199"/>
-          </a:xfrm>
-          <a:prstGeom prst="rect">
-            <a:avLst/>
-          </a:prstGeom>
-        </p:spPr>
-      </p:pic>
-    </p:spTree>
-    <p:extLst>
-      <p:ext uri="{BB962C8B-B14F-4D97-AF65-F5344CB8AC3E}">
-        <p14:creationId xmlns:p14="http://schemas.microsoft.com/office/powerpoint/2010/main" val="2503070687"/>
-      </p:ext>
-    </p:extLst>
-  </p:cSld>
-  <p:clrMapOvr>
-    <a:masterClrMapping/>
-  </p:clrMapOvr>
-  <mc:AlternateContent xmlns:mc="http://schemas.openxmlformats.org/markup-compatibility/2006">
-    <mc:Choice xmlns:p14="http://schemas.microsoft.com/office/powerpoint/2010/main" Requires="p14">
-      <p:transition spd="slow" p14:dur="2000"/>
-    </mc:Choice>
-    <mc:Fallback>
+    <mc:Fallback xmlns="">
       <p:transition xmlns:p14="http://schemas.microsoft.com/office/powerpoint/2010/main" spd="slow"/>
     </mc:Fallback>
   </mc:AlternateContent>
@@ -14881,15 +12601,7 @@
                   <a:srgbClr val="2C95DD"/>
                 </a:solidFill>
               </a:rPr>
-              <a:t>Cloud Native Application </a:t>
-            </a:r>
-            <a:r>
-              <a:rPr lang="en-US" sz="2800" dirty="0" smtClean="0">
-                <a:solidFill>
-                  <a:srgbClr val="2C95DD"/>
-                </a:solidFill>
-              </a:rPr>
-              <a:t>Platform - Services</a:t>
+              <a:t>Cloud Native Application Platform - Services</a:t>
             </a:r>
             <a:endParaRPr lang="en-US" sz="2800" dirty="0">
               <a:solidFill>
@@ -14915,540 +12627,6 @@
     </mc:Choice>
     <mc:Fallback xmlns="">
       <p:transition xmlns:p14="http://schemas.microsoft.com/office/powerpoint/2010/main"/>
-    </mc:Fallback>
-  </mc:AlternateContent>
-  <p:timing>
-    <p:tnLst>
-      <p:par>
-        <p:cTn xmlns:p14="http://schemas.microsoft.com/office/powerpoint/2010/main" id="1" dur="indefinite" restart="never" nodeType="tmRoot"/>
-      </p:par>
-    </p:tnLst>
-  </p:timing>
-</p:sld>
-</file>
-
-<file path=ppt/slides/slide20.xml><?xml version="1.0" encoding="utf-8"?>
-<p:sld xmlns:a="http://schemas.openxmlformats.org/drawingml/2006/main" xmlns:r="http://schemas.openxmlformats.org/officeDocument/2006/relationships" xmlns:p="http://schemas.openxmlformats.org/presentationml/2006/main">
-  <p:cSld>
-    <p:spTree>
-      <p:nvGrpSpPr>
-        <p:cNvPr id="1" name=""/>
-        <p:cNvGrpSpPr/>
-        <p:nvPr/>
-      </p:nvGrpSpPr>
-      <p:grpSpPr>
-        <a:xfrm>
-          <a:off x="0" y="0"/>
-          <a:ext cx="0" cy="0"/>
-          <a:chOff x="0" y="0"/>
-          <a:chExt cx="0" cy="0"/>
-        </a:xfrm>
-      </p:grpSpPr>
-      <p:sp>
-        <p:nvSpPr>
-          <p:cNvPr id="2" name="Title 1"/>
-          <p:cNvSpPr>
-            <a:spLocks noGrp="1"/>
-          </p:cNvSpPr>
-          <p:nvPr>
-            <p:ph type="title"/>
-          </p:nvPr>
-        </p:nvSpPr>
-        <p:spPr/>
-        <p:txBody>
-          <a:bodyPr/>
-          <a:lstStyle/>
-          <a:p>
-            <a:r>
-              <a:rPr lang="en-US" sz="2800" dirty="0">
-                <a:solidFill>
-                  <a:srgbClr val="2C95DD"/>
-                </a:solidFill>
-              </a:rPr>
-              <a:t>API </a:t>
-            </a:r>
-            <a:r>
-              <a:rPr lang="en-US" sz="2800" dirty="0">
-                <a:solidFill>
-                  <a:srgbClr val="2C95DD"/>
-                </a:solidFill>
-              </a:rPr>
-              <a:t>G</a:t>
-            </a:r>
-            <a:r>
-              <a:rPr lang="en-US" sz="2800" dirty="0">
-                <a:solidFill>
-                  <a:srgbClr val="2C95DD"/>
-                </a:solidFill>
-              </a:rPr>
-              <a:t>ateway</a:t>
-            </a:r>
-            <a:endParaRPr lang="en-US" sz="2800" dirty="0">
-              <a:solidFill>
-                <a:srgbClr val="2C95DD"/>
-              </a:solidFill>
-            </a:endParaRPr>
-          </a:p>
-        </p:txBody>
-      </p:sp>
-      <p:sp>
-        <p:nvSpPr>
-          <p:cNvPr id="3" name="Content Placeholder 2"/>
-          <p:cNvSpPr>
-            <a:spLocks noGrp="1"/>
-          </p:cNvSpPr>
-          <p:nvPr>
-            <p:ph sz="quarter" idx="4294967295"/>
-          </p:nvPr>
-        </p:nvSpPr>
-        <p:spPr>
-          <a:xfrm>
-            <a:off x="381000" y="884464"/>
-            <a:ext cx="6589089" cy="2362200"/>
-          </a:xfrm>
-          <a:prstGeom prst="rect">
-            <a:avLst/>
-          </a:prstGeom>
-        </p:spPr>
-        <p:txBody>
-          <a:bodyPr/>
-          <a:lstStyle/>
-          <a:p>
-            <a:r>
-              <a:rPr lang="en-US" sz="2000" dirty="0" smtClean="0">
-                <a:solidFill>
-                  <a:srgbClr val="FFFFFF"/>
-                </a:solidFill>
-              </a:rPr>
-              <a:t>Problem</a:t>
-            </a:r>
-          </a:p>
-          <a:p>
-            <a:pPr marL="285750" lvl="1" indent="-285750">
-              <a:buFont typeface="Arial"/>
-              <a:buChar char="•"/>
-            </a:pPr>
-            <a:r>
-              <a:rPr lang="en-US" sz="1800" dirty="0" smtClean="0">
-                <a:solidFill>
-                  <a:srgbClr val="FFFFFF"/>
-                </a:solidFill>
-              </a:rPr>
-              <a:t>Legacy APIs are not optimized for mobile</a:t>
-            </a:r>
-          </a:p>
-          <a:p>
-            <a:pPr marL="285750" lvl="1" indent="-285750">
-              <a:buFont typeface="Arial"/>
-              <a:buChar char="•"/>
-            </a:pPr>
-            <a:r>
-              <a:rPr lang="en-US" sz="1800" dirty="0" smtClean="0">
-                <a:solidFill>
-                  <a:srgbClr val="FFFFFF"/>
-                </a:solidFill>
-              </a:rPr>
-              <a:t>Too much unnecessary content delivered to devices</a:t>
-            </a:r>
-          </a:p>
-          <a:p>
-            <a:pPr marL="285750" lvl="1" indent="-285750">
-              <a:buFont typeface="Arial"/>
-              <a:buChar char="•"/>
-            </a:pPr>
-            <a:r>
-              <a:rPr lang="en-US" sz="1800" dirty="0">
-                <a:solidFill>
-                  <a:srgbClr val="FFFFFF"/>
-                </a:solidFill>
-              </a:rPr>
-              <a:t>Mobile very sensitive to latency (often weak or no signal)</a:t>
-            </a:r>
-          </a:p>
-          <a:p>
-            <a:pPr marL="285750" lvl="1" indent="-285750">
-              <a:buFont typeface="Arial"/>
-              <a:buChar char="•"/>
-            </a:pPr>
-            <a:r>
-              <a:rPr lang="en-US" sz="1800" dirty="0" smtClean="0">
-                <a:solidFill>
-                  <a:srgbClr val="FFFFFF"/>
-                </a:solidFill>
-              </a:rPr>
-              <a:t>Mobile apps often require several API calls to display a single page of </a:t>
-            </a:r>
-            <a:r>
-              <a:rPr lang="en-US" sz="1800" dirty="0" smtClean="0">
-                <a:solidFill>
-                  <a:srgbClr val="FFFFFF"/>
-                </a:solidFill>
-              </a:rPr>
-              <a:t>content</a:t>
-            </a:r>
-          </a:p>
-          <a:p>
-            <a:pPr lvl="1"/>
-            <a:endParaRPr lang="en-US" sz="1800" dirty="0" smtClean="0">
-              <a:solidFill>
-                <a:srgbClr val="FFFFFF"/>
-              </a:solidFill>
-            </a:endParaRPr>
-          </a:p>
-          <a:p>
-            <a:r>
-              <a:rPr lang="en-US" sz="2000" dirty="0">
-                <a:solidFill>
-                  <a:srgbClr val="FFFFFF"/>
-                </a:solidFill>
-              </a:rPr>
-              <a:t>Solution / Benefits</a:t>
-            </a:r>
-          </a:p>
-          <a:p>
-            <a:pPr marL="285750" lvl="1" indent="-285750">
-              <a:buFont typeface="Arial"/>
-              <a:buChar char="•"/>
-            </a:pPr>
-            <a:r>
-              <a:rPr lang="en-US" sz="1800" dirty="0">
-                <a:solidFill>
-                  <a:srgbClr val="FFFFFF"/>
-                </a:solidFill>
-              </a:rPr>
-              <a:t>Allows mobile developers to easily transform APIs</a:t>
-            </a:r>
-          </a:p>
-          <a:p>
-            <a:pPr marL="285750" lvl="2" indent="-285750">
-              <a:buFont typeface="Arial"/>
-              <a:buChar char="•"/>
-            </a:pPr>
-            <a:r>
-              <a:rPr lang="en-US" sz="1800" dirty="0">
-                <a:solidFill>
-                  <a:srgbClr val="FFFFFF"/>
-                </a:solidFill>
-              </a:rPr>
-              <a:t>Deliver mobile-optimized, device specific content </a:t>
-            </a:r>
-          </a:p>
-          <a:p>
-            <a:pPr marL="285750" lvl="1" indent="-285750">
-              <a:buFont typeface="Arial"/>
-              <a:buChar char="•"/>
-            </a:pPr>
-            <a:r>
-              <a:rPr lang="en-US" sz="1800" dirty="0">
-                <a:solidFill>
-                  <a:srgbClr val="FFFFFF"/>
-                </a:solidFill>
-                <a:sym typeface="Wingdings"/>
-              </a:rPr>
-              <a:t>Results in improved performance and user experience</a:t>
-            </a:r>
-            <a:endParaRPr lang="en-US" sz="1800" dirty="0">
-              <a:solidFill>
-                <a:srgbClr val="FFFFFF"/>
-              </a:solidFill>
-            </a:endParaRPr>
-          </a:p>
-          <a:p>
-            <a:endParaRPr lang="en-US" sz="2200" dirty="0" smtClean="0">
-              <a:solidFill>
-                <a:srgbClr val="FFFFFF"/>
-              </a:solidFill>
-            </a:endParaRPr>
-          </a:p>
-        </p:txBody>
-      </p:sp>
-    </p:spTree>
-    <p:extLst>
-      <p:ext uri="{BB962C8B-B14F-4D97-AF65-F5344CB8AC3E}">
-        <p14:creationId xmlns:p14="http://schemas.microsoft.com/office/powerpoint/2010/main" val="3694444729"/>
-      </p:ext>
-    </p:extLst>
-  </p:cSld>
-  <p:clrMapOvr>
-    <a:masterClrMapping/>
-  </p:clrMapOvr>
-  <mc:AlternateContent xmlns:mc="http://schemas.openxmlformats.org/markup-compatibility/2006">
-    <mc:Choice xmlns:p14="http://schemas.microsoft.com/office/powerpoint/2010/main" Requires="p14">
-      <p:transition spd="slow" p14:dur="2000"/>
-    </mc:Choice>
-    <mc:Fallback>
-      <p:transition xmlns:p14="http://schemas.microsoft.com/office/powerpoint/2010/main" spd="slow"/>
-    </mc:Fallback>
-  </mc:AlternateContent>
-  <p:timing>
-    <p:tnLst>
-      <p:par>
-        <p:cTn xmlns:p14="http://schemas.microsoft.com/office/powerpoint/2010/main" id="1" dur="indefinite" restart="never" nodeType="tmRoot"/>
-      </p:par>
-    </p:tnLst>
-  </p:timing>
-</p:sld>
-</file>
-
-<file path=ppt/slides/slide21.xml><?xml version="1.0" encoding="utf-8"?>
-<p:sld xmlns:a="http://schemas.openxmlformats.org/drawingml/2006/main" xmlns:r="http://schemas.openxmlformats.org/officeDocument/2006/relationships" xmlns:p="http://schemas.openxmlformats.org/presentationml/2006/main">
-  <p:cSld>
-    <p:spTree>
-      <p:nvGrpSpPr>
-        <p:cNvPr id="1" name=""/>
-        <p:cNvGrpSpPr/>
-        <p:nvPr/>
-      </p:nvGrpSpPr>
-      <p:grpSpPr>
-        <a:xfrm>
-          <a:off x="0" y="0"/>
-          <a:ext cx="0" cy="0"/>
-          <a:chOff x="0" y="0"/>
-          <a:chExt cx="0" cy="0"/>
-        </a:xfrm>
-      </p:grpSpPr>
-      <p:sp>
-        <p:nvSpPr>
-          <p:cNvPr id="2" name="Title 1"/>
-          <p:cNvSpPr>
-            <a:spLocks noGrp="1"/>
-          </p:cNvSpPr>
-          <p:nvPr>
-            <p:ph type="title"/>
-          </p:nvPr>
-        </p:nvSpPr>
-        <p:spPr/>
-        <p:txBody>
-          <a:bodyPr/>
-          <a:lstStyle/>
-          <a:p>
-            <a:r>
-              <a:rPr lang="en-US" sz="2800" dirty="0">
-                <a:solidFill>
-                  <a:srgbClr val="2C95DD"/>
-                </a:solidFill>
-              </a:rPr>
-              <a:t>App Distribution</a:t>
-            </a:r>
-            <a:endParaRPr lang="en-US" sz="2800" dirty="0">
-              <a:solidFill>
-                <a:srgbClr val="2C95DD"/>
-              </a:solidFill>
-            </a:endParaRPr>
-          </a:p>
-        </p:txBody>
-      </p:sp>
-      <p:sp>
-        <p:nvSpPr>
-          <p:cNvPr id="3" name="Content Placeholder 2"/>
-          <p:cNvSpPr>
-            <a:spLocks noGrp="1"/>
-          </p:cNvSpPr>
-          <p:nvPr>
-            <p:ph sz="quarter" idx="4294967295"/>
-          </p:nvPr>
-        </p:nvSpPr>
-        <p:spPr>
-          <a:xfrm>
-            <a:off x="381001" y="993321"/>
-            <a:ext cx="4292600" cy="1447800"/>
-          </a:xfrm>
-          <a:prstGeom prst="rect">
-            <a:avLst/>
-          </a:prstGeom>
-        </p:spPr>
-        <p:txBody>
-          <a:bodyPr/>
-          <a:lstStyle/>
-          <a:p>
-            <a:r>
-              <a:rPr lang="en-US" sz="2000" b="1" dirty="0" smtClean="0">
-                <a:solidFill>
-                  <a:srgbClr val="FFFFFF"/>
-                </a:solidFill>
-              </a:rPr>
-              <a:t>Problem</a:t>
-            </a:r>
-          </a:p>
-          <a:p>
-            <a:pPr marL="285750" lvl="1" indent="-285750">
-              <a:buFont typeface="Arial"/>
-              <a:buChar char="•"/>
-            </a:pPr>
-            <a:r>
-              <a:rPr lang="en-US" sz="1800" dirty="0" smtClean="0">
-                <a:solidFill>
-                  <a:srgbClr val="FFFFFF"/>
-                </a:solidFill>
-              </a:rPr>
-              <a:t>Extensive user testing of apps is critical to success</a:t>
-            </a:r>
-          </a:p>
-          <a:p>
-            <a:pPr marL="285750" lvl="1" indent="-285750">
-              <a:buFont typeface="Arial"/>
-              <a:buChar char="•"/>
-            </a:pPr>
-            <a:r>
-              <a:rPr lang="en-US" sz="1800" dirty="0" smtClean="0">
-                <a:solidFill>
-                  <a:srgbClr val="FFFFFF"/>
-                </a:solidFill>
-              </a:rPr>
-              <a:t>Difficult to distribute pre-release apps to test users</a:t>
-            </a:r>
-          </a:p>
-          <a:p>
-            <a:pPr marL="285750" lvl="1" indent="-285750">
-              <a:buFont typeface="Arial"/>
-              <a:buChar char="•"/>
-            </a:pPr>
-            <a:r>
-              <a:rPr lang="en-US" sz="1800" dirty="0" smtClean="0">
-                <a:solidFill>
-                  <a:srgbClr val="FFFFFF"/>
-                </a:solidFill>
-              </a:rPr>
-              <a:t>Existing solutions are public </a:t>
-            </a:r>
-            <a:r>
-              <a:rPr lang="en-US" sz="1800" dirty="0" smtClean="0">
-                <a:solidFill>
-                  <a:srgbClr val="FFFFFF"/>
-                </a:solidFill>
-              </a:rPr>
-              <a:t>cloud</a:t>
-            </a:r>
-          </a:p>
-          <a:p>
-            <a:pPr lvl="1"/>
-            <a:endParaRPr lang="en-US" sz="1800" dirty="0" smtClean="0">
-              <a:solidFill>
-                <a:srgbClr val="FFFFFF"/>
-              </a:solidFill>
-            </a:endParaRPr>
-          </a:p>
-          <a:p>
-            <a:r>
-              <a:rPr lang="en-US" sz="2000" b="1" dirty="0">
-                <a:solidFill>
-                  <a:srgbClr val="FFFFFF"/>
-                </a:solidFill>
-              </a:rPr>
-              <a:t>Solution / Benefits</a:t>
-            </a:r>
-          </a:p>
-          <a:p>
-            <a:pPr marL="285750" lvl="1" indent="-285750">
-              <a:buFont typeface="Arial"/>
-              <a:buChar char="•"/>
-            </a:pPr>
-            <a:r>
-              <a:rPr lang="en-US" sz="1800" dirty="0">
-                <a:solidFill>
-                  <a:srgbClr val="FFFFFF"/>
-                </a:solidFill>
-              </a:rPr>
-              <a:t>Easy OTA app distribution</a:t>
-            </a:r>
-          </a:p>
-          <a:p>
-            <a:pPr marL="285750" lvl="1" indent="-285750">
-              <a:buFont typeface="Arial"/>
-              <a:buChar char="•"/>
-            </a:pPr>
-            <a:r>
-              <a:rPr lang="en-US" sz="1800" dirty="0">
-                <a:solidFill>
-                  <a:srgbClr val="FFFFFF"/>
-                </a:solidFill>
-              </a:rPr>
-              <a:t>User / team management</a:t>
-            </a:r>
-          </a:p>
-          <a:p>
-            <a:pPr marL="285750" lvl="1" indent="-285750">
-              <a:buFont typeface="Arial"/>
-              <a:buChar char="•"/>
-            </a:pPr>
-            <a:r>
-              <a:rPr lang="en-US" sz="1800" dirty="0">
-                <a:solidFill>
-                  <a:srgbClr val="FFFFFF"/>
-                </a:solidFill>
-              </a:rPr>
-              <a:t>Supports all major platforms</a:t>
-            </a:r>
-          </a:p>
-          <a:p>
-            <a:pPr marL="285750" lvl="1" indent="-285750">
-              <a:buFont typeface="Arial"/>
-              <a:buChar char="•"/>
-            </a:pPr>
-            <a:r>
-              <a:rPr lang="en-US" sz="1800" dirty="0">
-                <a:solidFill>
-                  <a:srgbClr val="FFFFFF"/>
-                </a:solidFill>
-              </a:rPr>
-              <a:t>Private cloud for control / security</a:t>
-            </a:r>
-          </a:p>
-          <a:p>
-            <a:endParaRPr lang="en-US" sz="2200" dirty="0" smtClean="0">
-              <a:solidFill>
-                <a:srgbClr val="FFFFFF"/>
-              </a:solidFill>
-            </a:endParaRPr>
-          </a:p>
-        </p:txBody>
-      </p:sp>
-      <p:pic>
-        <p:nvPicPr>
-          <p:cNvPr id="4" name="Picture 3" descr="app-dist.png"/>
-          <p:cNvPicPr>
-            <a:picLocks noChangeAspect="1"/>
-          </p:cNvPicPr>
-          <p:nvPr/>
-        </p:nvPicPr>
-        <p:blipFill>
-          <a:blip r:embed="rId3">
-            <a:extLst>
-              <a:ext uri="{28A0092B-C50C-407E-A947-70E740481C1C}">
-                <a14:useLocalDpi xmlns:a14="http://schemas.microsoft.com/office/drawing/2010/main" val="0"/>
-              </a:ext>
-            </a:extLst>
-          </a:blip>
-          <a:stretch>
-            <a:fillRect/>
-          </a:stretch>
-        </p:blipFill>
-        <p:spPr>
-          <a:xfrm>
-            <a:off x="4761430" y="1197430"/>
-            <a:ext cx="4285649" cy="2764064"/>
-          </a:xfrm>
-          <a:prstGeom prst="rect">
-            <a:avLst/>
-          </a:prstGeom>
-        </p:spPr>
-      </p:pic>
-    </p:spTree>
-    <p:extLst>
-      <p:ext uri="{BB962C8B-B14F-4D97-AF65-F5344CB8AC3E}">
-        <p14:creationId xmlns:p14="http://schemas.microsoft.com/office/powerpoint/2010/main" val="1137540586"/>
-      </p:ext>
-    </p:extLst>
-  </p:cSld>
-  <p:clrMapOvr>
-    <a:masterClrMapping/>
-  </p:clrMapOvr>
-  <mc:AlternateContent xmlns:mc="http://schemas.openxmlformats.org/markup-compatibility/2006">
-    <mc:Choice xmlns:p14="http://schemas.microsoft.com/office/powerpoint/2010/main" Requires="p14">
-      <p:transition spd="slow" p14:dur="2000"/>
-    </mc:Choice>
-    <mc:Fallback>
-      <p:transition xmlns:p14="http://schemas.microsoft.com/office/powerpoint/2010/main" spd="slow"/>
     </mc:Fallback>
   </mc:AlternateContent>
   <p:timing>
@@ -15517,23 +12695,7 @@
                   <a:srgbClr val="FFFFFF"/>
                 </a:solidFill>
               </a:rPr>
-              <a:t>Allows </a:t>
-            </a:r>
-            <a:r>
-              <a:rPr lang="en-US" sz="1800" dirty="0">
-                <a:solidFill>
-                  <a:srgbClr val="FFFFFF"/>
-                </a:solidFill>
-              </a:rPr>
-              <a:t>resources to be easily provisioned on-</a:t>
-            </a:r>
-            <a:r>
-              <a:rPr lang="en-US" sz="1800" dirty="0">
-                <a:solidFill>
-                  <a:srgbClr val="FFFFFF"/>
-                </a:solidFill>
-              </a:rPr>
-              <a:t>demand</a:t>
+              <a:t>Allows resources to be easily provisioned on-demand</a:t>
             </a:r>
           </a:p>
           <a:p>
@@ -15553,23 +12715,7 @@
                   <a:srgbClr val="FFFFFF"/>
                 </a:solidFill>
               </a:rPr>
-              <a:t>Typically </a:t>
-            </a:r>
-            <a:r>
-              <a:rPr lang="en-US" sz="1800" dirty="0">
-                <a:solidFill>
-                  <a:srgbClr val="FFFFFF"/>
-                </a:solidFill>
-              </a:rPr>
-              <a:t>middleware, frameworks, and other “components” </a:t>
-            </a:r>
-            <a:r>
-              <a:rPr lang="en-US" sz="1800" dirty="0">
-                <a:solidFill>
-                  <a:srgbClr val="FFFFFF"/>
-                </a:solidFill>
-              </a:rPr>
-              <a:t>necessary for applications</a:t>
+              <a:t>Typically middleware, frameworks, and other “components” necessary for applications</a:t>
             </a:r>
           </a:p>
           <a:p>
@@ -15607,11 +12753,6 @@
               </a:rPr>
               <a:t> layer</a:t>
             </a:r>
-            <a:endParaRPr lang="en-US" sz="1800" dirty="0">
-              <a:solidFill>
-                <a:srgbClr val="FFFFFF"/>
-              </a:solidFill>
-            </a:endParaRPr>
           </a:p>
         </p:txBody>
       </p:sp>
@@ -15723,11 +12864,11 @@
   <p:clrMapOvr>
     <a:masterClrMapping/>
   </p:clrMapOvr>
-  <mc:AlternateContent xmlns:mc="http://schemas.openxmlformats.org/markup-compatibility/2006">
-    <mc:Choice xmlns:p14="http://schemas.microsoft.com/office/powerpoint/2010/main" Requires="p14">
+  <mc:AlternateContent xmlns:mc="http://schemas.openxmlformats.org/markup-compatibility/2006" xmlns:p14="http://schemas.microsoft.com/office/powerpoint/2010/main">
+    <mc:Choice Requires="p14">
       <p:transition spd="slow" p14:dur="2000"/>
     </mc:Choice>
-    <mc:Fallback>
+    <mc:Fallback xmlns="">
       <p:transition xmlns:p14="http://schemas.microsoft.com/office/powerpoint/2010/main" spd="slow"/>
     </mc:Fallback>
   </mc:AlternateContent>
@@ -15822,11 +12963,6 @@
               </a:rPr>
               <a:t>Types of Services</a:t>
             </a:r>
-            <a:endParaRPr lang="en-US" sz="2800" dirty="0">
-              <a:solidFill>
-                <a:srgbClr val="2C95DD"/>
-              </a:solidFill>
-            </a:endParaRPr>
           </a:p>
         </p:txBody>
       </p:sp>
@@ -16469,7 +13605,7 @@
       </p:sp>
       <p:pic>
         <p:nvPicPr>
-          <p:cNvPr id="18" name="Picture 17" descr="icon_apigateway_cf@2x.png"/>
+          <p:cNvPr id="19" name="Picture 18" descr="icon_cloudbees_cf@2x.png"/>
           <p:cNvPicPr>
             <a:picLocks noChangeAspect="1"/>
           </p:cNvPicPr>
@@ -16477,36 +13613,6 @@
         </p:nvPicPr>
         <p:blipFill>
           <a:blip r:embed="rId3" cstate="screen">
-            <a:extLst>
-              <a:ext uri="{28A0092B-C50C-407E-A947-70E740481C1C}">
-                <a14:useLocalDpi xmlns:a14="http://schemas.microsoft.com/office/drawing/2010/main"/>
-              </a:ext>
-            </a:extLst>
-          </a:blip>
-          <a:stretch>
-            <a:fillRect/>
-          </a:stretch>
-        </p:blipFill>
-        <p:spPr>
-          <a:xfrm>
-            <a:off x="335280" y="1625600"/>
-            <a:ext cx="640080" cy="640080"/>
-          </a:xfrm>
-          <a:prstGeom prst="rect">
-            <a:avLst/>
-          </a:prstGeom>
-        </p:spPr>
-      </p:pic>
-      <p:pic>
-        <p:nvPicPr>
-          <p:cNvPr id="19" name="Picture 18" descr="icon_cloudbees_cf@2x.png"/>
-          <p:cNvPicPr>
-            <a:picLocks noChangeAspect="1"/>
-          </p:cNvPicPr>
-          <p:nvPr/>
-        </p:nvPicPr>
-        <p:blipFill>
-          <a:blip r:embed="rId4" cstate="screen">
             <a:extLst>
               <a:ext uri="{28A0092B-C50C-407E-A947-70E740481C1C}">
                 <a14:useLocalDpi xmlns:a14="http://schemas.microsoft.com/office/drawing/2010/main"/>
@@ -16536,7 +13642,7 @@
           <p:nvPr/>
         </p:nvPicPr>
         <p:blipFill>
-          <a:blip r:embed="rId5" cstate="screen">
+          <a:blip r:embed="rId4" cstate="screen">
             <a:extLst>
               <a:ext uri="{28A0092B-C50C-407E-A947-70E740481C1C}">
                 <a14:useLocalDpi xmlns:a14="http://schemas.microsoft.com/office/drawing/2010/main"/>
@@ -16559,36 +13665,6 @@
       </p:pic>
       <p:pic>
         <p:nvPicPr>
-          <p:cNvPr id="21" name="Picture 20" descr="icon_datasync_cf@2x.png"/>
-          <p:cNvPicPr>
-            <a:picLocks noChangeAspect="1"/>
-          </p:cNvPicPr>
-          <p:nvPr/>
-        </p:nvPicPr>
-        <p:blipFill>
-          <a:blip r:embed="rId6" cstate="screen">
-            <a:extLst>
-              <a:ext uri="{28A0092B-C50C-407E-A947-70E740481C1C}">
-                <a14:useLocalDpi xmlns:a14="http://schemas.microsoft.com/office/drawing/2010/main"/>
-              </a:ext>
-            </a:extLst>
-          </a:blip>
-          <a:stretch>
-            <a:fillRect/>
-          </a:stretch>
-        </p:blipFill>
-        <p:spPr>
-          <a:xfrm>
-            <a:off x="335280" y="3097828"/>
-            <a:ext cx="640080" cy="640080"/>
-          </a:xfrm>
-          <a:prstGeom prst="rect">
-            <a:avLst/>
-          </a:prstGeom>
-        </p:spPr>
-      </p:pic>
-      <p:pic>
-        <p:nvPicPr>
           <p:cNvPr id="22" name="Picture 21" descr="icon_gemfire_cf@2x.png"/>
           <p:cNvPicPr>
             <a:picLocks noChangeAspect="1"/>
@@ -16596,7 +13672,7 @@
           <p:nvPr/>
         </p:nvPicPr>
         <p:blipFill>
-          <a:blip r:embed="rId7" cstate="screen">
+          <a:blip r:embed="rId5" cstate="screen">
             <a:alphaModFix amt="47000"/>
             <a:extLst>
               <a:ext uri="{28A0092B-C50C-407E-A947-70E740481C1C}">
@@ -16627,7 +13703,7 @@
           <p:nvPr/>
         </p:nvPicPr>
         <p:blipFill>
-          <a:blip r:embed="rId8" cstate="screen">
+          <a:blip r:embed="rId6" cstate="screen">
             <a:extLst>
               <a:ext uri="{28A0092B-C50C-407E-A947-70E740481C1C}">
                 <a14:useLocalDpi xmlns:a14="http://schemas.microsoft.com/office/drawing/2010/main"/>
@@ -16640,7 +13716,7 @@
         </p:blipFill>
         <p:spPr>
           <a:xfrm>
-            <a:off x="335281" y="2357121"/>
+            <a:off x="335281" y="2050549"/>
             <a:ext cx="640079" cy="640079"/>
           </a:xfrm>
           <a:prstGeom prst="rect">
@@ -16657,7 +13733,7 @@
           <p:nvPr/>
         </p:nvPicPr>
         <p:blipFill>
-          <a:blip r:embed="rId9" cstate="screen">
+          <a:blip r:embed="rId7" cstate="screen">
             <a:extLst>
               <a:ext uri="{28A0092B-C50C-407E-A947-70E740481C1C}">
                 <a14:useLocalDpi xmlns:a14="http://schemas.microsoft.com/office/drawing/2010/main"/>
@@ -16687,7 +13763,7 @@
           <p:nvPr/>
         </p:nvPicPr>
         <p:blipFill>
-          <a:blip r:embed="rId10" cstate="screen">
+          <a:blip r:embed="rId8" cstate="screen">
             <a:extLst>
               <a:ext uri="{28A0092B-C50C-407E-A947-70E740481C1C}">
                 <a14:useLocalDpi xmlns:a14="http://schemas.microsoft.com/office/drawing/2010/main"/>
@@ -16710,15 +13786,14 @@
       </p:pic>
       <p:pic>
         <p:nvPicPr>
-          <p:cNvPr id="26" name="Picture 25" descr="icon_springxd_cf@2x.png"/>
+          <p:cNvPr id="27" name="Picture 26"/>
           <p:cNvPicPr>
             <a:picLocks noChangeAspect="1"/>
           </p:cNvPicPr>
           <p:nvPr/>
         </p:nvPicPr>
         <p:blipFill>
-          <a:blip r:embed="rId11" cstate="screen">
-            <a:alphaModFix/>
+          <a:blip r:embed="rId9" cstate="screen">
             <a:extLst>
               <a:ext uri="{28A0092B-C50C-407E-A947-70E740481C1C}">
                 <a14:useLocalDpi xmlns:a14="http://schemas.microsoft.com/office/drawing/2010/main"/>
@@ -16731,37 +13806,7 @@
         </p:blipFill>
         <p:spPr>
           <a:xfrm>
-            <a:off x="5384800" y="3088640"/>
-            <a:ext cx="640080" cy="640080"/>
-          </a:xfrm>
-          <a:prstGeom prst="rect">
-            <a:avLst/>
-          </a:prstGeom>
-        </p:spPr>
-      </p:pic>
-      <p:pic>
-        <p:nvPicPr>
-          <p:cNvPr id="27" name="Picture 26"/>
-          <p:cNvPicPr>
-            <a:picLocks noChangeAspect="1"/>
-          </p:cNvPicPr>
-          <p:nvPr/>
-        </p:nvPicPr>
-        <p:blipFill>
-          <a:blip r:embed="rId12" cstate="screen">
-            <a:extLst>
-              <a:ext uri="{28A0092B-C50C-407E-A947-70E740481C1C}">
-                <a14:useLocalDpi xmlns:a14="http://schemas.microsoft.com/office/drawing/2010/main"/>
-              </a:ext>
-            </a:extLst>
-          </a:blip>
-          <a:stretch>
-            <a:fillRect/>
-          </a:stretch>
-        </p:blipFill>
-        <p:spPr>
-          <a:xfrm>
-            <a:off x="335280" y="3835400"/>
+            <a:off x="335280" y="2839041"/>
             <a:ext cx="635000" cy="635000"/>
           </a:xfrm>
           <a:prstGeom prst="rect">
@@ -16778,7 +13823,7 @@
           <p:nvPr/>
         </p:nvPicPr>
         <p:blipFill>
-          <a:blip r:embed="rId13" cstate="screen">
+          <a:blip r:embed="rId10" cstate="screen">
             <a:extLst>
               <a:ext uri="{28A0092B-C50C-407E-A947-70E740481C1C}">
                 <a14:useLocalDpi xmlns:a14="http://schemas.microsoft.com/office/drawing/2010/main"/>
@@ -16808,7 +13853,7 @@
           <p:nvPr/>
         </p:nvPicPr>
         <p:blipFill>
-          <a:blip r:embed="rId14" cstate="screen">
+          <a:blip r:embed="rId11" cstate="screen">
             <a:alphaModFix/>
             <a:extLst>
               <a:ext uri="{28A0092B-C50C-407E-A947-70E740481C1C}">
@@ -16822,7 +13867,7 @@
         </p:blipFill>
         <p:spPr>
           <a:xfrm>
-            <a:off x="5384800" y="3830320"/>
+            <a:off x="5384800" y="3074839"/>
             <a:ext cx="635000" cy="635000"/>
           </a:xfrm>
           <a:prstGeom prst="rect">
@@ -16839,7 +13884,7 @@
           <p:nvPr/>
         </p:nvPicPr>
         <p:blipFill>
-          <a:blip r:embed="rId15" cstate="screen">
+          <a:blip r:embed="rId12" cstate="screen">
             <a:extLst>
               <a:ext uri="{28A0092B-C50C-407E-A947-70E740481C1C}">
                 <a14:useLocalDpi xmlns:a14="http://schemas.microsoft.com/office/drawing/2010/main"/>
@@ -16869,7 +13914,7 @@
           <p:nvPr/>
         </p:nvPicPr>
         <p:blipFill>
-          <a:blip r:embed="rId16" cstate="screen">
+          <a:blip r:embed="rId13" cstate="screen">
             <a:extLst>
               <a:ext uri="{28A0092B-C50C-407E-A947-70E740481C1C}">
                 <a14:useLocalDpi xmlns:a14="http://schemas.microsoft.com/office/drawing/2010/main"/>
@@ -16899,7 +13944,7 @@
           <p:nvPr/>
         </p:nvPicPr>
         <p:blipFill>
-          <a:blip r:embed="rId17" cstate="screen">
+          <a:blip r:embed="rId14" cstate="screen">
             <a:extLst>
               <a:ext uri="{28A0092B-C50C-407E-A947-70E740481C1C}">
                 <a14:useLocalDpi xmlns:a14="http://schemas.microsoft.com/office/drawing/2010/main"/>
@@ -16927,7 +13972,7 @@
           <p:nvPr/>
         </p:nvPicPr>
         <p:blipFill>
-          <a:blip r:embed="rId18" cstate="screen">
+          <a:blip r:embed="rId15" cstate="screen">
             <a:extLst>
               <a:ext uri="{28A0092B-C50C-407E-A947-70E740481C1C}">
                 <a14:useLocalDpi xmlns:a14="http://schemas.microsoft.com/office/drawing/2010/main"/>
@@ -16960,7 +14005,7 @@
           <p:nvPr/>
         </p:nvPicPr>
         <p:blipFill>
-          <a:blip r:embed="rId19" cstate="screen">
+          <a:blip r:embed="rId16" cstate="screen">
             <a:extLst>
               <a:ext uri="{28A0092B-C50C-407E-A947-70E740481C1C}">
                 <a14:useLocalDpi xmlns:a14="http://schemas.microsoft.com/office/drawing/2010/main"/>
@@ -16993,7 +14038,7 @@
           <p:nvPr/>
         </p:nvPicPr>
         <p:blipFill>
-          <a:blip r:embed="rId20" cstate="screen">
+          <a:blip r:embed="rId17" cstate="screen">
             <a:extLst>
               <a:ext uri="{28A0092B-C50C-407E-A947-70E740481C1C}">
                 <a14:useLocalDpi xmlns:a14="http://schemas.microsoft.com/office/drawing/2010/main"/>
@@ -17028,7 +14073,7 @@
           <p:nvPr/>
         </p:nvPicPr>
         <p:blipFill>
-          <a:blip r:embed="rId21" cstate="screen">
+          <a:blip r:embed="rId18" cstate="screen">
             <a:extLst>
               <a:ext uri="{28A0092B-C50C-407E-A947-70E740481C1C}">
                 <a14:useLocalDpi xmlns:a14="http://schemas.microsoft.com/office/drawing/2010/main"/>
@@ -17051,48 +14096,13 @@
       </p:pic>
       <p:sp>
         <p:nvSpPr>
-          <p:cNvPr id="11" name="TextBox 10"/>
-          <p:cNvSpPr txBox="1"/>
-          <p:nvPr/>
-        </p:nvSpPr>
-        <p:spPr>
-          <a:xfrm>
-            <a:off x="985519" y="1625600"/>
-            <a:ext cx="1005841" cy="276999"/>
-          </a:xfrm>
-          <a:prstGeom prst="rect">
-            <a:avLst/>
-          </a:prstGeom>
-          <a:noFill/>
-        </p:spPr>
-        <p:txBody>
-          <a:bodyPr wrap="square" rtlCol="0">
-            <a:spAutoFit/>
-          </a:bodyPr>
-          <a:lstStyle/>
-          <a:p>
-            <a:r>
-              <a:rPr lang="en-US" sz="1200" dirty="0" smtClean="0">
-                <a:solidFill>
-                  <a:schemeClr val="bg2"/>
-                </a:solidFill>
-                <a:latin typeface="FreightSans Pro Medium"/>
-                <a:cs typeface="FreightSans Pro Medium"/>
-              </a:rPr>
-              <a:t>API Gateway</a:t>
-            </a:r>
-          </a:p>
-        </p:txBody>
-      </p:sp>
-      <p:sp>
-        <p:nvSpPr>
           <p:cNvPr id="38" name="TextBox 37"/>
           <p:cNvSpPr txBox="1"/>
           <p:nvPr/>
         </p:nvSpPr>
         <p:spPr>
           <a:xfrm>
-            <a:off x="975359" y="2336800"/>
+            <a:off x="975359" y="2030228"/>
             <a:ext cx="1005841" cy="461665"/>
           </a:xfrm>
           <a:prstGeom prst="rect">
@@ -17121,48 +14131,13 @@
       </p:sp>
       <p:sp>
         <p:nvSpPr>
-          <p:cNvPr id="39" name="TextBox 38"/>
-          <p:cNvSpPr txBox="1"/>
-          <p:nvPr/>
-        </p:nvSpPr>
-        <p:spPr>
-          <a:xfrm>
-            <a:off x="985519" y="3108960"/>
-            <a:ext cx="1005841" cy="276999"/>
-          </a:xfrm>
-          <a:prstGeom prst="rect">
-            <a:avLst/>
-          </a:prstGeom>
-          <a:noFill/>
-        </p:spPr>
-        <p:txBody>
-          <a:bodyPr wrap="square" rtlCol="0">
-            <a:spAutoFit/>
-          </a:bodyPr>
-          <a:lstStyle/>
-          <a:p>
-            <a:r>
-              <a:rPr lang="en-US" sz="1200" dirty="0" smtClean="0">
-                <a:solidFill>
-                  <a:schemeClr val="bg2"/>
-                </a:solidFill>
-                <a:latin typeface="FreightSans Pro Medium"/>
-                <a:cs typeface="FreightSans Pro Medium"/>
-              </a:rPr>
-              <a:t>Data Sync</a:t>
-            </a:r>
-          </a:p>
-        </p:txBody>
-      </p:sp>
-      <p:sp>
-        <p:nvSpPr>
           <p:cNvPr id="40" name="TextBox 39"/>
           <p:cNvSpPr txBox="1"/>
           <p:nvPr/>
         </p:nvSpPr>
         <p:spPr>
           <a:xfrm>
-            <a:off x="985519" y="3840480"/>
+            <a:off x="985519" y="2844121"/>
             <a:ext cx="1005841" cy="461665"/>
           </a:xfrm>
           <a:prstGeom prst="rect">
@@ -17268,48 +14243,13 @@
       </p:sp>
       <p:sp>
         <p:nvSpPr>
-          <p:cNvPr id="43" name="TextBox 42"/>
-          <p:cNvSpPr txBox="1"/>
-          <p:nvPr/>
-        </p:nvSpPr>
-        <p:spPr>
-          <a:xfrm>
-            <a:off x="6055359" y="3256012"/>
-            <a:ext cx="1005841" cy="276999"/>
-          </a:xfrm>
-          <a:prstGeom prst="rect">
-            <a:avLst/>
-          </a:prstGeom>
-          <a:noFill/>
-        </p:spPr>
-        <p:txBody>
-          <a:bodyPr wrap="square" rtlCol="0">
-            <a:spAutoFit/>
-          </a:bodyPr>
-          <a:lstStyle/>
-          <a:p>
-            <a:r>
-              <a:rPr lang="en-US" sz="1200" dirty="0" smtClean="0">
-                <a:solidFill>
-                  <a:schemeClr val="bg2"/>
-                </a:solidFill>
-                <a:latin typeface="FreightSans Pro Medium"/>
-                <a:cs typeface="FreightSans Pro Medium"/>
-              </a:rPr>
-              <a:t>Spring XD</a:t>
-            </a:r>
-          </a:p>
-        </p:txBody>
-      </p:sp>
-      <p:sp>
-        <p:nvSpPr>
           <p:cNvPr id="44" name="TextBox 43"/>
           <p:cNvSpPr txBox="1"/>
           <p:nvPr/>
         </p:nvSpPr>
         <p:spPr>
           <a:xfrm>
-            <a:off x="6055359" y="3840480"/>
+            <a:off x="6055359" y="3084999"/>
             <a:ext cx="1005841" cy="461665"/>
           </a:xfrm>
           <a:prstGeom prst="rect">
@@ -17779,7 +14719,7 @@
     </p:spTree>
     <p:extLst>
       <p:ext uri="{BB962C8B-B14F-4D97-AF65-F5344CB8AC3E}">
-        <p14:creationId xmlns:p14="http://schemas.microsoft.com/office/powerpoint/2010/main" val="4023211362"/>
+        <p14:creationId xmlns:p14="http://schemas.microsoft.com/office/powerpoint/2010/main" val="4159633347"/>
       </p:ext>
     </p:extLst>
   </p:cSld>
@@ -17851,11 +14791,6 @@
               </a:rPr>
               <a:t>Broker</a:t>
             </a:r>
-            <a:endParaRPr lang="en-US" sz="2800" dirty="0">
-              <a:solidFill>
-                <a:srgbClr val="2C95DD"/>
-              </a:solidFill>
-            </a:endParaRPr>
           </a:p>
         </p:txBody>
       </p:sp>
@@ -20028,11 +16963,11 @@
   <p:clrMapOvr>
     <a:masterClrMapping/>
   </p:clrMapOvr>
-  <mc:AlternateContent xmlns:mc="http://schemas.openxmlformats.org/markup-compatibility/2006">
-    <mc:Choice xmlns:p14="http://schemas.microsoft.com/office/powerpoint/2010/main" Requires="p14">
+  <mc:AlternateContent xmlns:mc="http://schemas.openxmlformats.org/markup-compatibility/2006" xmlns:p14="http://schemas.microsoft.com/office/powerpoint/2010/main">
+    <mc:Choice Requires="p14">
       <p:transition spd="slow" p14:dur="2000"/>
     </mc:Choice>
-    <mc:Fallback>
+    <mc:Fallback xmlns="">
       <p:transition xmlns:p14="http://schemas.microsoft.com/office/powerpoint/2010/main" spd="slow"/>
     </mc:Fallback>
   </mc:AlternateContent>
@@ -23456,11 +20391,6 @@
               </a:rPr>
               <a:t>Cloud Foundry Services</a:t>
             </a:r>
-            <a:endParaRPr lang="en-US" sz="2800" dirty="0">
-              <a:solidFill>
-                <a:srgbClr val="2C95DD"/>
-              </a:solidFill>
-            </a:endParaRPr>
           </a:p>
         </p:txBody>
       </p:sp>
@@ -23882,11 +20812,6 @@
               </a:rPr>
               <a:t>Marketplace</a:t>
             </a:r>
-            <a:endParaRPr lang="en-US" sz="2800" dirty="0">
-              <a:solidFill>
-                <a:srgbClr val="2C95DD"/>
-              </a:solidFill>
-            </a:endParaRPr>
           </a:p>
         </p:txBody>
       </p:sp>
@@ -24198,21 +21123,8 @@
                   <a:srgbClr val="FFFFFF"/>
                 </a:solidFill>
               </a:rPr>
-              <a:t>Broad Services </a:t>
-            </a:r>
-            <a:r>
-              <a:rPr lang="en-US" sz="2400" dirty="0" smtClean="0">
-                <a:solidFill>
-                  <a:srgbClr val="FFFFFF"/>
-                </a:solidFill>
-              </a:rPr>
-              <a:t>Ecosystem</a:t>
-            </a:r>
-            <a:endParaRPr lang="en-US" sz="2400" dirty="0" smtClean="0">
-              <a:solidFill>
-                <a:srgbClr val="FFFFFF"/>
-              </a:solidFill>
-            </a:endParaRPr>
+              <a:t>Broad Services Ecosystem</a:t>
+            </a:r>
           </a:p>
           <a:p>
             <a:pPr marL="342900" indent="-342900">
@@ -24232,15 +21144,7 @@
                   <a:srgbClr val="FFFFFF"/>
                 </a:solidFill>
               </a:rPr>
-              <a:t>Easy </a:t>
-            </a:r>
-            <a:r>
-              <a:rPr lang="en-US" sz="2400" dirty="0" smtClean="0">
-                <a:solidFill>
-                  <a:srgbClr val="FFFFFF"/>
-                </a:solidFill>
-              </a:rPr>
-              <a:t>accessibility</a:t>
+              <a:t>Easy accessibility</a:t>
             </a:r>
             <a:endParaRPr lang="en-US" sz="2400" dirty="0">
               <a:solidFill>

</xml_diff>